<commit_message>
Class Notes push Update
</commit_message>
<xml_diff>
--- a/Homework/ch 5 conditionals.pptx
+++ b/Homework/ch 5 conditionals.pptx
@@ -5,31 +5,17 @@
     <p:sldMasterId id="2147483660" r:id="rId1"/>
   </p:sldMasterIdLst>
   <p:sldIdLst>
-    <p:sldId id="256" r:id="rId2"/>
-    <p:sldId id="257" r:id="rId3"/>
-    <p:sldId id="258" r:id="rId4"/>
-    <p:sldId id="259" r:id="rId5"/>
-    <p:sldId id="276" r:id="rId6"/>
-    <p:sldId id="260" r:id="rId7"/>
-    <p:sldId id="261" r:id="rId8"/>
-    <p:sldId id="262" r:id="rId9"/>
-    <p:sldId id="263" r:id="rId10"/>
-    <p:sldId id="277" r:id="rId11"/>
-    <p:sldId id="264" r:id="rId12"/>
-    <p:sldId id="265" r:id="rId13"/>
-    <p:sldId id="266" r:id="rId14"/>
-    <p:sldId id="267" r:id="rId15"/>
-    <p:sldId id="278" r:id="rId16"/>
-    <p:sldId id="268" r:id="rId17"/>
-    <p:sldId id="279" r:id="rId18"/>
-    <p:sldId id="280" r:id="rId19"/>
-    <p:sldId id="269" r:id="rId20"/>
-    <p:sldId id="270" r:id="rId21"/>
-    <p:sldId id="271" r:id="rId22"/>
-    <p:sldId id="272" r:id="rId23"/>
-    <p:sldId id="273" r:id="rId24"/>
-    <p:sldId id="274" r:id="rId25"/>
-    <p:sldId id="275" r:id="rId26"/>
+    <p:sldId id="258" r:id="rId2"/>
+    <p:sldId id="276" r:id="rId3"/>
+    <p:sldId id="262" r:id="rId4"/>
+    <p:sldId id="277" r:id="rId5"/>
+    <p:sldId id="278" r:id="rId6"/>
+    <p:sldId id="279" r:id="rId7"/>
+    <p:sldId id="280" r:id="rId8"/>
+    <p:sldId id="272" r:id="rId9"/>
+    <p:sldId id="273" r:id="rId10"/>
+    <p:sldId id="274" r:id="rId11"/>
+    <p:sldId id="275" r:id="rId12"/>
   </p:sldIdLst>
   <p:sldSz cx="6858000" cy="9144000" type="screen4x3"/>
   <p:notesSz cx="6858000" cy="9144000"/>
@@ -178,7 +164,7 @@
           </a:lstStyle>
           <a:p>
             <a:r>
-              <a:rPr lang="en-US" smtClean="0"/>
+              <a:rPr lang="en-US"/>
               <a:t>Click to edit Master title style</a:t>
             </a:r>
             <a:endParaRPr lang="en-US" dirty="0"/>
@@ -243,7 +229,7 @@
           </a:lstStyle>
           <a:p>
             <a:r>
-              <a:rPr lang="en-US" smtClean="0"/>
+              <a:rPr lang="en-US"/>
               <a:t>Click to edit Master subtitle style</a:t>
             </a:r>
             <a:endParaRPr lang="en-US" dirty="0"/>
@@ -267,7 +253,7 @@
           <a:p>
             <a:fld id="{A9AABDFA-EE45-4641-8F0F-654583BCD001}" type="datetimeFigureOut">
               <a:rPr lang="en-US" smtClean="0"/>
-              <a:t>8/29/2016</a:t>
+              <a:t>5/9/2019</a:t>
             </a:fld>
             <a:endParaRPr lang="en-US"/>
           </a:p>
@@ -361,7 +347,7 @@
           <a:lstStyle/>
           <a:p>
             <a:r>
-              <a:rPr lang="en-US" smtClean="0"/>
+              <a:rPr lang="en-US"/>
               <a:t>Click to edit Master title style</a:t>
             </a:r>
             <a:endParaRPr lang="en-US" dirty="0"/>
@@ -385,35 +371,35 @@
           <a:p>
             <a:pPr lvl="0"/>
             <a:r>
-              <a:rPr lang="en-US" smtClean="0"/>
+              <a:rPr lang="en-US"/>
               <a:t>Click to edit Master text styles</a:t>
             </a:r>
           </a:p>
           <a:p>
             <a:pPr lvl="1"/>
             <a:r>
-              <a:rPr lang="en-US" smtClean="0"/>
+              <a:rPr lang="en-US"/>
               <a:t>Second level</a:t>
             </a:r>
           </a:p>
           <a:p>
             <a:pPr lvl="2"/>
             <a:r>
-              <a:rPr lang="en-US" smtClean="0"/>
+              <a:rPr lang="en-US"/>
               <a:t>Third level</a:t>
             </a:r>
           </a:p>
           <a:p>
             <a:pPr lvl="3"/>
             <a:r>
-              <a:rPr lang="en-US" smtClean="0"/>
+              <a:rPr lang="en-US"/>
               <a:t>Fourth level</a:t>
             </a:r>
           </a:p>
           <a:p>
             <a:pPr lvl="4"/>
             <a:r>
-              <a:rPr lang="en-US" smtClean="0"/>
+              <a:rPr lang="en-US"/>
               <a:t>Fifth level</a:t>
             </a:r>
             <a:endParaRPr lang="en-US" dirty="0"/>
@@ -437,7 +423,7 @@
           <a:p>
             <a:fld id="{A9AABDFA-EE45-4641-8F0F-654583BCD001}" type="datetimeFigureOut">
               <a:rPr lang="en-US" smtClean="0"/>
-              <a:t>8/29/2016</a:t>
+              <a:t>5/9/2019</a:t>
             </a:fld>
             <a:endParaRPr lang="en-US"/>
           </a:p>
@@ -536,7 +522,7 @@
           <a:lstStyle/>
           <a:p>
             <a:r>
-              <a:rPr lang="en-US" smtClean="0"/>
+              <a:rPr lang="en-US"/>
               <a:t>Click to edit Master title style</a:t>
             </a:r>
             <a:endParaRPr lang="en-US" dirty="0"/>
@@ -565,35 +551,35 @@
           <a:p>
             <a:pPr lvl="0"/>
             <a:r>
-              <a:rPr lang="en-US" smtClean="0"/>
+              <a:rPr lang="en-US"/>
               <a:t>Click to edit Master text styles</a:t>
             </a:r>
           </a:p>
           <a:p>
             <a:pPr lvl="1"/>
             <a:r>
-              <a:rPr lang="en-US" smtClean="0"/>
+              <a:rPr lang="en-US"/>
               <a:t>Second level</a:t>
             </a:r>
           </a:p>
           <a:p>
             <a:pPr lvl="2"/>
             <a:r>
-              <a:rPr lang="en-US" smtClean="0"/>
+              <a:rPr lang="en-US"/>
               <a:t>Third level</a:t>
             </a:r>
           </a:p>
           <a:p>
             <a:pPr lvl="3"/>
             <a:r>
-              <a:rPr lang="en-US" smtClean="0"/>
+              <a:rPr lang="en-US"/>
               <a:t>Fourth level</a:t>
             </a:r>
           </a:p>
           <a:p>
             <a:pPr lvl="4"/>
             <a:r>
-              <a:rPr lang="en-US" smtClean="0"/>
+              <a:rPr lang="en-US"/>
               <a:t>Fifth level</a:t>
             </a:r>
             <a:endParaRPr lang="en-US" dirty="0"/>
@@ -617,7 +603,7 @@
           <a:p>
             <a:fld id="{A9AABDFA-EE45-4641-8F0F-654583BCD001}" type="datetimeFigureOut">
               <a:rPr lang="en-US" smtClean="0"/>
-              <a:t>8/29/2016</a:t>
+              <a:t>5/9/2019</a:t>
             </a:fld>
             <a:endParaRPr lang="en-US"/>
           </a:p>
@@ -711,7 +697,7 @@
           <a:lstStyle/>
           <a:p>
             <a:r>
-              <a:rPr lang="en-US" smtClean="0"/>
+              <a:rPr lang="en-US"/>
               <a:t>Click to edit Master title style</a:t>
             </a:r>
             <a:endParaRPr lang="en-US" dirty="0"/>
@@ -735,35 +721,35 @@
           <a:p>
             <a:pPr lvl="0"/>
             <a:r>
-              <a:rPr lang="en-US" smtClean="0"/>
+              <a:rPr lang="en-US"/>
               <a:t>Click to edit Master text styles</a:t>
             </a:r>
           </a:p>
           <a:p>
             <a:pPr lvl="1"/>
             <a:r>
-              <a:rPr lang="en-US" smtClean="0"/>
+              <a:rPr lang="en-US"/>
               <a:t>Second level</a:t>
             </a:r>
           </a:p>
           <a:p>
             <a:pPr lvl="2"/>
             <a:r>
-              <a:rPr lang="en-US" smtClean="0"/>
+              <a:rPr lang="en-US"/>
               <a:t>Third level</a:t>
             </a:r>
           </a:p>
           <a:p>
             <a:pPr lvl="3"/>
             <a:r>
-              <a:rPr lang="en-US" smtClean="0"/>
+              <a:rPr lang="en-US"/>
               <a:t>Fourth level</a:t>
             </a:r>
           </a:p>
           <a:p>
             <a:pPr lvl="4"/>
             <a:r>
-              <a:rPr lang="en-US" smtClean="0"/>
+              <a:rPr lang="en-US"/>
               <a:t>Fifth level</a:t>
             </a:r>
             <a:endParaRPr lang="en-US" dirty="0"/>
@@ -787,7 +773,7 @@
           <a:p>
             <a:fld id="{A9AABDFA-EE45-4641-8F0F-654583BCD001}" type="datetimeFigureOut">
               <a:rPr lang="en-US" smtClean="0"/>
-              <a:t>8/29/2016</a:t>
+              <a:t>5/9/2019</a:t>
             </a:fld>
             <a:endParaRPr lang="en-US"/>
           </a:p>
@@ -890,7 +876,7 @@
           </a:lstStyle>
           <a:p>
             <a:r>
-              <a:rPr lang="en-US" smtClean="0"/>
+              <a:rPr lang="en-US"/>
               <a:t>Click to edit Master title style</a:t>
             </a:r>
             <a:endParaRPr lang="en-US" dirty="0"/>
@@ -1008,7 +994,7 @@
           <a:p>
             <a:pPr lvl="0"/>
             <a:r>
-              <a:rPr lang="en-US" smtClean="0"/>
+              <a:rPr lang="en-US"/>
               <a:t>Click to edit Master text styles</a:t>
             </a:r>
           </a:p>
@@ -1031,7 +1017,7 @@
           <a:p>
             <a:fld id="{A9AABDFA-EE45-4641-8F0F-654583BCD001}" type="datetimeFigureOut">
               <a:rPr lang="en-US" smtClean="0"/>
-              <a:t>8/29/2016</a:t>
+              <a:t>5/9/2019</a:t>
             </a:fld>
             <a:endParaRPr lang="en-US"/>
           </a:p>
@@ -1125,7 +1111,7 @@
           <a:lstStyle/>
           <a:p>
             <a:r>
-              <a:rPr lang="en-US" smtClean="0"/>
+              <a:rPr lang="en-US"/>
               <a:t>Click to edit Master title style</a:t>
             </a:r>
             <a:endParaRPr lang="en-US" dirty="0"/>
@@ -1154,35 +1140,35 @@
           <a:p>
             <a:pPr lvl="0"/>
             <a:r>
-              <a:rPr lang="en-US" smtClean="0"/>
+              <a:rPr lang="en-US"/>
               <a:t>Click to edit Master text styles</a:t>
             </a:r>
           </a:p>
           <a:p>
             <a:pPr lvl="1"/>
             <a:r>
-              <a:rPr lang="en-US" smtClean="0"/>
+              <a:rPr lang="en-US"/>
               <a:t>Second level</a:t>
             </a:r>
           </a:p>
           <a:p>
             <a:pPr lvl="2"/>
             <a:r>
-              <a:rPr lang="en-US" smtClean="0"/>
+              <a:rPr lang="en-US"/>
               <a:t>Third level</a:t>
             </a:r>
           </a:p>
           <a:p>
             <a:pPr lvl="3"/>
             <a:r>
-              <a:rPr lang="en-US" smtClean="0"/>
+              <a:rPr lang="en-US"/>
               <a:t>Fourth level</a:t>
             </a:r>
           </a:p>
           <a:p>
             <a:pPr lvl="4"/>
             <a:r>
-              <a:rPr lang="en-US" smtClean="0"/>
+              <a:rPr lang="en-US"/>
               <a:t>Fifth level</a:t>
             </a:r>
             <a:endParaRPr lang="en-US" dirty="0"/>
@@ -1211,35 +1197,35 @@
           <a:p>
             <a:pPr lvl="0"/>
             <a:r>
-              <a:rPr lang="en-US" smtClean="0"/>
+              <a:rPr lang="en-US"/>
               <a:t>Click to edit Master text styles</a:t>
             </a:r>
           </a:p>
           <a:p>
             <a:pPr lvl="1"/>
             <a:r>
-              <a:rPr lang="en-US" smtClean="0"/>
+              <a:rPr lang="en-US"/>
               <a:t>Second level</a:t>
             </a:r>
           </a:p>
           <a:p>
             <a:pPr lvl="2"/>
             <a:r>
-              <a:rPr lang="en-US" smtClean="0"/>
+              <a:rPr lang="en-US"/>
               <a:t>Third level</a:t>
             </a:r>
           </a:p>
           <a:p>
             <a:pPr lvl="3"/>
             <a:r>
-              <a:rPr lang="en-US" smtClean="0"/>
+              <a:rPr lang="en-US"/>
               <a:t>Fourth level</a:t>
             </a:r>
           </a:p>
           <a:p>
             <a:pPr lvl="4"/>
             <a:r>
-              <a:rPr lang="en-US" smtClean="0"/>
+              <a:rPr lang="en-US"/>
               <a:t>Fifth level</a:t>
             </a:r>
             <a:endParaRPr lang="en-US" dirty="0"/>
@@ -1263,7 +1249,7 @@
           <a:p>
             <a:fld id="{A9AABDFA-EE45-4641-8F0F-654583BCD001}" type="datetimeFigureOut">
               <a:rPr lang="en-US" smtClean="0"/>
-              <a:t>8/29/2016</a:t>
+              <a:t>5/9/2019</a:t>
             </a:fld>
             <a:endParaRPr lang="en-US"/>
           </a:p>
@@ -1362,7 +1348,7 @@
           <a:lstStyle/>
           <a:p>
             <a:r>
-              <a:rPr lang="en-US" smtClean="0"/>
+              <a:rPr lang="en-US"/>
               <a:t>Click to edit Master title style</a:t>
             </a:r>
             <a:endParaRPr lang="en-US" dirty="0"/>
@@ -1428,7 +1414,7 @@
           <a:p>
             <a:pPr lvl="0"/>
             <a:r>
-              <a:rPr lang="en-US" smtClean="0"/>
+              <a:rPr lang="en-US"/>
               <a:t>Click to edit Master text styles</a:t>
             </a:r>
           </a:p>
@@ -1456,35 +1442,35 @@
           <a:p>
             <a:pPr lvl="0"/>
             <a:r>
-              <a:rPr lang="en-US" smtClean="0"/>
+              <a:rPr lang="en-US"/>
               <a:t>Click to edit Master text styles</a:t>
             </a:r>
           </a:p>
           <a:p>
             <a:pPr lvl="1"/>
             <a:r>
-              <a:rPr lang="en-US" smtClean="0"/>
+              <a:rPr lang="en-US"/>
               <a:t>Second level</a:t>
             </a:r>
           </a:p>
           <a:p>
             <a:pPr lvl="2"/>
             <a:r>
-              <a:rPr lang="en-US" smtClean="0"/>
+              <a:rPr lang="en-US"/>
               <a:t>Third level</a:t>
             </a:r>
           </a:p>
           <a:p>
             <a:pPr lvl="3"/>
             <a:r>
-              <a:rPr lang="en-US" smtClean="0"/>
+              <a:rPr lang="en-US"/>
               <a:t>Fourth level</a:t>
             </a:r>
           </a:p>
           <a:p>
             <a:pPr lvl="4"/>
             <a:r>
-              <a:rPr lang="en-US" smtClean="0"/>
+              <a:rPr lang="en-US"/>
               <a:t>Fifth level</a:t>
             </a:r>
             <a:endParaRPr lang="en-US" dirty="0"/>
@@ -1550,7 +1536,7 @@
           <a:p>
             <a:pPr lvl="0"/>
             <a:r>
-              <a:rPr lang="en-US" smtClean="0"/>
+              <a:rPr lang="en-US"/>
               <a:t>Click to edit Master text styles</a:t>
             </a:r>
           </a:p>
@@ -1578,35 +1564,35 @@
           <a:p>
             <a:pPr lvl="0"/>
             <a:r>
-              <a:rPr lang="en-US" smtClean="0"/>
+              <a:rPr lang="en-US"/>
               <a:t>Click to edit Master text styles</a:t>
             </a:r>
           </a:p>
           <a:p>
             <a:pPr lvl="1"/>
             <a:r>
-              <a:rPr lang="en-US" smtClean="0"/>
+              <a:rPr lang="en-US"/>
               <a:t>Second level</a:t>
             </a:r>
           </a:p>
           <a:p>
             <a:pPr lvl="2"/>
             <a:r>
-              <a:rPr lang="en-US" smtClean="0"/>
+              <a:rPr lang="en-US"/>
               <a:t>Third level</a:t>
             </a:r>
           </a:p>
           <a:p>
             <a:pPr lvl="3"/>
             <a:r>
-              <a:rPr lang="en-US" smtClean="0"/>
+              <a:rPr lang="en-US"/>
               <a:t>Fourth level</a:t>
             </a:r>
           </a:p>
           <a:p>
             <a:pPr lvl="4"/>
             <a:r>
-              <a:rPr lang="en-US" smtClean="0"/>
+              <a:rPr lang="en-US"/>
               <a:t>Fifth level</a:t>
             </a:r>
             <a:endParaRPr lang="en-US" dirty="0"/>
@@ -1630,7 +1616,7 @@
           <a:p>
             <a:fld id="{A9AABDFA-EE45-4641-8F0F-654583BCD001}" type="datetimeFigureOut">
               <a:rPr lang="en-US" smtClean="0"/>
-              <a:t>8/29/2016</a:t>
+              <a:t>5/9/2019</a:t>
             </a:fld>
             <a:endParaRPr lang="en-US"/>
           </a:p>
@@ -1724,7 +1710,7 @@
           <a:lstStyle/>
           <a:p>
             <a:r>
-              <a:rPr lang="en-US" smtClean="0"/>
+              <a:rPr lang="en-US"/>
               <a:t>Click to edit Master title style</a:t>
             </a:r>
             <a:endParaRPr lang="en-US" dirty="0"/>
@@ -1748,7 +1734,7 @@
           <a:p>
             <a:fld id="{A9AABDFA-EE45-4641-8F0F-654583BCD001}" type="datetimeFigureOut">
               <a:rPr lang="en-US" smtClean="0"/>
-              <a:t>8/29/2016</a:t>
+              <a:t>5/9/2019</a:t>
             </a:fld>
             <a:endParaRPr lang="en-US"/>
           </a:p>
@@ -1843,7 +1829,7 @@
           <a:p>
             <a:fld id="{A9AABDFA-EE45-4641-8F0F-654583BCD001}" type="datetimeFigureOut">
               <a:rPr lang="en-US" smtClean="0"/>
-              <a:t>8/29/2016</a:t>
+              <a:t>5/9/2019</a:t>
             </a:fld>
             <a:endParaRPr lang="en-US"/>
           </a:p>
@@ -1946,7 +1932,7 @@
           </a:lstStyle>
           <a:p>
             <a:r>
-              <a:rPr lang="en-US" smtClean="0"/>
+              <a:rPr lang="en-US"/>
               <a:t>Click to edit Master title style</a:t>
             </a:r>
             <a:endParaRPr lang="en-US" dirty="0"/>
@@ -2003,35 +1989,35 @@
           <a:p>
             <a:pPr lvl="0"/>
             <a:r>
-              <a:rPr lang="en-US" smtClean="0"/>
+              <a:rPr lang="en-US"/>
               <a:t>Click to edit Master text styles</a:t>
             </a:r>
           </a:p>
           <a:p>
             <a:pPr lvl="1"/>
             <a:r>
-              <a:rPr lang="en-US" smtClean="0"/>
+              <a:rPr lang="en-US"/>
               <a:t>Second level</a:t>
             </a:r>
           </a:p>
           <a:p>
             <a:pPr lvl="2"/>
             <a:r>
-              <a:rPr lang="en-US" smtClean="0"/>
+              <a:rPr lang="en-US"/>
               <a:t>Third level</a:t>
             </a:r>
           </a:p>
           <a:p>
             <a:pPr lvl="3"/>
             <a:r>
-              <a:rPr lang="en-US" smtClean="0"/>
+              <a:rPr lang="en-US"/>
               <a:t>Fourth level</a:t>
             </a:r>
           </a:p>
           <a:p>
             <a:pPr lvl="4"/>
             <a:r>
-              <a:rPr lang="en-US" smtClean="0"/>
+              <a:rPr lang="en-US"/>
               <a:t>Fifth level</a:t>
             </a:r>
             <a:endParaRPr lang="en-US" dirty="0"/>
@@ -2097,7 +2083,7 @@
           <a:p>
             <a:pPr lvl="0"/>
             <a:r>
-              <a:rPr lang="en-US" smtClean="0"/>
+              <a:rPr lang="en-US"/>
               <a:t>Click to edit Master text styles</a:t>
             </a:r>
           </a:p>
@@ -2120,7 +2106,7 @@
           <a:p>
             <a:fld id="{A9AABDFA-EE45-4641-8F0F-654583BCD001}" type="datetimeFigureOut">
               <a:rPr lang="en-US" smtClean="0"/>
-              <a:t>8/29/2016</a:t>
+              <a:t>5/9/2019</a:t>
             </a:fld>
             <a:endParaRPr lang="en-US"/>
           </a:p>
@@ -2223,7 +2209,7 @@
           </a:lstStyle>
           <a:p>
             <a:r>
-              <a:rPr lang="en-US" smtClean="0"/>
+              <a:rPr lang="en-US"/>
               <a:t>Click to edit Master title style</a:t>
             </a:r>
             <a:endParaRPr lang="en-US" dirty="0"/>
@@ -2288,7 +2274,7 @@
           </a:lstStyle>
           <a:p>
             <a:r>
-              <a:rPr lang="en-US" smtClean="0"/>
+              <a:rPr lang="en-US"/>
               <a:t>Click icon to add picture</a:t>
             </a:r>
             <a:endParaRPr lang="en-US" dirty="0"/>
@@ -2354,7 +2340,7 @@
           <a:p>
             <a:pPr lvl="0"/>
             <a:r>
-              <a:rPr lang="en-US" smtClean="0"/>
+              <a:rPr lang="en-US"/>
               <a:t>Click to edit Master text styles</a:t>
             </a:r>
           </a:p>
@@ -2377,7 +2363,7 @@
           <a:p>
             <a:fld id="{A9AABDFA-EE45-4641-8F0F-654583BCD001}" type="datetimeFigureOut">
               <a:rPr lang="en-US" smtClean="0"/>
-              <a:t>8/29/2016</a:t>
+              <a:t>5/9/2019</a:t>
             </a:fld>
             <a:endParaRPr lang="en-US"/>
           </a:p>
@@ -2486,7 +2472,7 @@
           <a:lstStyle/>
           <a:p>
             <a:r>
-              <a:rPr lang="en-US" smtClean="0"/>
+              <a:rPr lang="en-US"/>
               <a:t>Click to edit Master title style</a:t>
             </a:r>
             <a:endParaRPr lang="en-US" dirty="0"/>
@@ -2520,35 +2506,35 @@
           <a:p>
             <a:pPr lvl="0"/>
             <a:r>
-              <a:rPr lang="en-US" smtClean="0"/>
+              <a:rPr lang="en-US"/>
               <a:t>Click to edit Master text styles</a:t>
             </a:r>
           </a:p>
           <a:p>
             <a:pPr lvl="1"/>
             <a:r>
-              <a:rPr lang="en-US" smtClean="0"/>
+              <a:rPr lang="en-US"/>
               <a:t>Second level</a:t>
             </a:r>
           </a:p>
           <a:p>
             <a:pPr lvl="2"/>
             <a:r>
-              <a:rPr lang="en-US" smtClean="0"/>
+              <a:rPr lang="en-US"/>
               <a:t>Third level</a:t>
             </a:r>
           </a:p>
           <a:p>
             <a:pPr lvl="3"/>
             <a:r>
-              <a:rPr lang="en-US" smtClean="0"/>
+              <a:rPr lang="en-US"/>
               <a:t>Fourth level</a:t>
             </a:r>
           </a:p>
           <a:p>
             <a:pPr lvl="4"/>
             <a:r>
-              <a:rPr lang="en-US" smtClean="0"/>
+              <a:rPr lang="en-US"/>
               <a:t>Fifth level</a:t>
             </a:r>
             <a:endParaRPr lang="en-US" dirty="0"/>
@@ -2590,7 +2576,7 @@
           <a:p>
             <a:fld id="{A9AABDFA-EE45-4641-8F0F-654583BCD001}" type="datetimeFigureOut">
               <a:rPr lang="en-US" smtClean="0"/>
-              <a:t>8/29/2016</a:t>
+              <a:t>5/9/2019</a:t>
             </a:fld>
             <a:endParaRPr lang="en-US"/>
           </a:p>
@@ -2995,51 +2981,159 @@
           <a:chExt cx="0" cy="0"/>
         </a:xfrm>
       </p:grpSpPr>
-      <p:pic>
-        <p:nvPicPr>
-          <p:cNvPr id="1026" name="Picture 2" descr="C:\Users\cwellman\AppData\Roaming\PixelMetrics\CaptureWiz\Temp\74.png"/>
-          <p:cNvPicPr>
-            <a:picLocks noChangeAspect="1" noChangeArrowheads="1"/>
-          </p:cNvPicPr>
+      <p:sp>
+        <p:nvSpPr>
+          <p:cNvPr id="2" name="TextBox 1"/>
+          <p:cNvSpPr txBox="1"/>
           <p:nvPr/>
-        </p:nvPicPr>
-        <p:blipFill>
-          <a:blip r:embed="rId2">
-            <a:extLst>
-              <a:ext uri="{28A0092B-C50C-407E-A947-70E740481C1C}">
-                <a14:useLocalDpi xmlns:a14="http://schemas.microsoft.com/office/drawing/2010/main" val="0"/>
-              </a:ext>
-            </a:extLst>
-          </a:blip>
-          <a:srcRect/>
-          <a:stretch>
-            <a:fillRect/>
-          </a:stretch>
-        </p:blipFill>
-        <p:spPr bwMode="auto">
+        </p:nvSpPr>
+        <p:spPr>
           <a:xfrm>
-            <a:off x="154983" y="370668"/>
-            <a:ext cx="6584490" cy="8246390"/>
+            <a:off x="0" y="0"/>
+            <a:ext cx="6620210" cy="4247317"/>
           </a:xfrm>
           <a:prstGeom prst="rect">
             <a:avLst/>
           </a:prstGeom>
           <a:noFill/>
-          <a:extLst>
-            <a:ext uri="{909E8E84-426E-40DD-AFC4-6F175D3DCCD1}">
-              <a14:hiddenFill xmlns:a14="http://schemas.microsoft.com/office/drawing/2010/main">
-                <a:solidFill>
-                  <a:srgbClr val="FFFFFF"/>
-                </a:solidFill>
-              </a14:hiddenFill>
-            </a:ext>
-          </a:extLst>
         </p:spPr>
-      </p:pic>
+        <p:txBody>
+          <a:bodyPr wrap="none" rtlCol="0">
+            <a:spAutoFit/>
+          </a:bodyPr>
+          <a:lstStyle/>
+          <a:p>
+            <a:r>
+              <a:rPr lang="en-US" dirty="0"/>
+              <a:t>WS ch5_1</a:t>
+            </a:r>
+          </a:p>
+          <a:p>
+            <a:r>
+              <a:rPr lang="en-US" dirty="0"/>
+              <a:t>For </a:t>
+            </a:r>
+            <a:r>
+              <a:rPr lang="en-US" dirty="0" err="1"/>
+              <a:t>ints</a:t>
+            </a:r>
+            <a:r>
+              <a:rPr lang="en-US" dirty="0"/>
+              <a:t> from 1 to 20, which </a:t>
+            </a:r>
+            <a:r>
+              <a:rPr lang="en-US" dirty="0" err="1"/>
+              <a:t>ints</a:t>
+            </a:r>
+            <a:r>
+              <a:rPr lang="en-US" dirty="0"/>
+              <a:t> n is (n % 2 == 0)   and (n % 3 == 0)   ?</a:t>
+            </a:r>
+          </a:p>
+          <a:p>
+            <a:endParaRPr lang="en-US" dirty="0"/>
+          </a:p>
+          <a:p>
+            <a:r>
+              <a:rPr lang="en-US" dirty="0"/>
+              <a:t>For </a:t>
+            </a:r>
+            <a:r>
+              <a:rPr lang="en-US" dirty="0" err="1"/>
+              <a:t>ints</a:t>
+            </a:r>
+            <a:r>
+              <a:rPr lang="en-US" dirty="0"/>
+              <a:t> from 1 to 20, which </a:t>
+            </a:r>
+            <a:r>
+              <a:rPr lang="en-US" dirty="0" err="1"/>
+              <a:t>ints</a:t>
+            </a:r>
+            <a:r>
+              <a:rPr lang="en-US" dirty="0"/>
+              <a:t> n is (n % 2 == 0)   or (n % 3 == 0)   ?</a:t>
+            </a:r>
+          </a:p>
+          <a:p>
+            <a:endParaRPr lang="en-US" dirty="0"/>
+          </a:p>
+          <a:p>
+            <a:r>
+              <a:rPr lang="en-US" dirty="0"/>
+              <a:t>What </a:t>
+            </a:r>
+            <a:r>
+              <a:rPr lang="en-US" dirty="0" err="1"/>
+              <a:t>ints</a:t>
+            </a:r>
+            <a:r>
+              <a:rPr lang="en-US" dirty="0"/>
+              <a:t> from 1 to 20 satisfy neither condition?</a:t>
+            </a:r>
+          </a:p>
+          <a:p>
+            <a:endParaRPr lang="en-US" dirty="0"/>
+          </a:p>
+          <a:p>
+            <a:endParaRPr lang="en-US" dirty="0"/>
+          </a:p>
+          <a:p>
+            <a:r>
+              <a:rPr lang="en-US" dirty="0"/>
+              <a:t>def is_20_div_by_2_3(x):</a:t>
+            </a:r>
+          </a:p>
+          <a:p>
+            <a:r>
+              <a:rPr lang="en-US" dirty="0"/>
+              <a:t>    if x % 2 == 0 and x % 3 == 0:</a:t>
+            </a:r>
+          </a:p>
+          <a:p>
+            <a:r>
+              <a:rPr lang="en-US" dirty="0"/>
+              <a:t>        return f"{x} is divisible by 2 and 3."</a:t>
+            </a:r>
+          </a:p>
+          <a:p>
+            <a:r>
+              <a:rPr lang="en-US" dirty="0"/>
+              <a:t>    </a:t>
+            </a:r>
+            <a:r>
+              <a:rPr lang="en-US" dirty="0" err="1"/>
+              <a:t>elif</a:t>
+            </a:r>
+            <a:r>
+              <a:rPr lang="en-US" dirty="0"/>
+              <a:t> x % 2 == 0 or x % 3 == 0:</a:t>
+            </a:r>
+          </a:p>
+          <a:p>
+            <a:r>
+              <a:rPr lang="en-US" dirty="0"/>
+              <a:t>        return f'{x} is divisible by 2 or 3'</a:t>
+            </a:r>
+          </a:p>
+          <a:p>
+            <a:r>
+              <a:rPr lang="en-US" dirty="0"/>
+              <a:t>    else:</a:t>
+            </a:r>
+          </a:p>
+          <a:p>
+            <a:r>
+              <a:rPr lang="en-US" dirty="0"/>
+              <a:t>        return f'{x} is not divisible by 2 or 3.'</a:t>
+            </a:r>
+          </a:p>
+        </p:txBody>
+      </p:sp>
     </p:spTree>
     <p:extLst>
       <p:ext uri="{BB962C8B-B14F-4D97-AF65-F5344CB8AC3E}">
-        <p14:creationId xmlns:p14="http://schemas.microsoft.com/office/powerpoint/2010/main" val="4006937454"/>
+        <p14:creationId xmlns:p14="http://schemas.microsoft.com/office/powerpoint/2010/main" val="145390040"/>
       </p:ext>
     </p:extLst>
   </p:cSld>
@@ -3066,114 +3160,51 @@
           <a:chExt cx="0" cy="0"/>
         </a:xfrm>
       </p:grpSpPr>
-      <p:sp>
-        <p:nvSpPr>
-          <p:cNvPr id="4" name="TextBox 3"/>
-          <p:cNvSpPr txBox="1"/>
+      <p:pic>
+        <p:nvPicPr>
+          <p:cNvPr id="17410" name="Picture 2" descr="C:\Users\cwellman\AppData\Roaming\PixelMetrics\CaptureWiz\Temp\90.png"/>
+          <p:cNvPicPr>
+            <a:picLocks noChangeAspect="1" noChangeArrowheads="1"/>
+          </p:cNvPicPr>
           <p:nvPr/>
-        </p:nvSpPr>
-        <p:spPr>
+        </p:nvPicPr>
+        <p:blipFill>
+          <a:blip r:embed="rId2">
+            <a:extLst>
+              <a:ext uri="{28A0092B-C50C-407E-A947-70E740481C1C}">
+                <a14:useLocalDpi xmlns:a14="http://schemas.microsoft.com/office/drawing/2010/main" val="0"/>
+              </a:ext>
+            </a:extLst>
+          </a:blip>
+          <a:srcRect/>
+          <a:stretch>
+            <a:fillRect/>
+          </a:stretch>
+        </p:blipFill>
+        <p:spPr bwMode="auto">
           <a:xfrm>
-            <a:off x="139485" y="340962"/>
-            <a:ext cx="6416298" cy="2585323"/>
+            <a:off x="124578" y="-1"/>
+            <a:ext cx="6468401" cy="6261315"/>
           </a:xfrm>
           <a:prstGeom prst="rect">
             <a:avLst/>
           </a:prstGeom>
           <a:noFill/>
+          <a:extLst>
+            <a:ext uri="{909E8E84-426E-40DD-AFC4-6F175D3DCCD1}">
+              <a14:hiddenFill xmlns:a14="http://schemas.microsoft.com/office/drawing/2010/main">
+                <a:solidFill>
+                  <a:srgbClr val="FFFFFF"/>
+                </a:solidFill>
+              </a14:hiddenFill>
+            </a:ext>
+          </a:extLst>
         </p:spPr>
-        <p:txBody>
-          <a:bodyPr wrap="square" rtlCol="0">
-            <a:spAutoFit/>
-          </a:bodyPr>
-          <a:lstStyle/>
-          <a:p>
-            <a:r>
-              <a:rPr lang="en-US" dirty="0"/>
-              <a:t>WS ch5_5</a:t>
-            </a:r>
-          </a:p>
-          <a:p>
-            <a:r>
-              <a:rPr lang="en-US" dirty="0"/>
-              <a:t>Write a function, tell_if_d3_and_not_d5(</a:t>
-            </a:r>
-            <a:r>
-              <a:rPr lang="en-US" dirty="0" err="1"/>
-              <a:t>num</a:t>
-            </a:r>
-            <a:r>
-              <a:rPr lang="en-US" dirty="0"/>
-              <a:t>),</a:t>
-            </a:r>
-          </a:p>
-          <a:p>
-            <a:r>
-              <a:rPr lang="en-US" dirty="0"/>
-              <a:t>which prints out an appropriate message for all </a:t>
-            </a:r>
-            <a:r>
-              <a:rPr lang="en-US" dirty="0" err="1"/>
-              <a:t>num</a:t>
-            </a:r>
-            <a:endParaRPr lang="en-US" dirty="0"/>
-          </a:p>
-          <a:p>
-            <a:r>
-              <a:rPr lang="en-US" dirty="0"/>
-              <a:t>regarding if </a:t>
-            </a:r>
-            <a:r>
-              <a:rPr lang="en-US" dirty="0" err="1"/>
-              <a:t>num</a:t>
-            </a:r>
-            <a:r>
-              <a:rPr lang="en-US" dirty="0"/>
-              <a:t> is divisible by 3 but</a:t>
-            </a:r>
-          </a:p>
-          <a:p>
-            <a:r>
-              <a:rPr lang="en-US" dirty="0"/>
-              <a:t>not divisible by 5.</a:t>
-            </a:r>
-          </a:p>
-          <a:p>
-            <a:endParaRPr lang="en-US" dirty="0" smtClean="0"/>
-          </a:p>
-          <a:p>
-            <a:endParaRPr lang="en-US" dirty="0"/>
-          </a:p>
-          <a:p>
-            <a:r>
-              <a:rPr lang="en-US" dirty="0" smtClean="0"/>
-              <a:t>Use </a:t>
-            </a:r>
-            <a:r>
-              <a:rPr lang="en-US" dirty="0"/>
-              <a:t>this function to print out an appropriate message</a:t>
-            </a:r>
-          </a:p>
-          <a:p>
-            <a:r>
-              <a:rPr lang="en-US" dirty="0"/>
-              <a:t>for each </a:t>
-            </a:r>
-            <a:r>
-              <a:rPr lang="en-US" dirty="0" err="1"/>
-              <a:t>int</a:t>
-            </a:r>
-            <a:r>
-              <a:rPr lang="en-US" dirty="0"/>
-              <a:t> from 2 to 20.</a:t>
-            </a:r>
-          </a:p>
-        </p:txBody>
-      </p:sp>
+      </p:pic>
     </p:spTree>
     <p:extLst>
       <p:ext uri="{BB962C8B-B14F-4D97-AF65-F5344CB8AC3E}">
-        <p14:creationId xmlns:p14="http://schemas.microsoft.com/office/powerpoint/2010/main" val="1749491387"/>
+        <p14:creationId xmlns:p14="http://schemas.microsoft.com/office/powerpoint/2010/main" val="1214920892"/>
       </p:ext>
     </p:extLst>
   </p:cSld>
@@ -3200,300 +3231,16 @@
           <a:chExt cx="0" cy="0"/>
         </a:xfrm>
       </p:grpSpPr>
-      <p:pic>
-        <p:nvPicPr>
-          <p:cNvPr id="7170" name="Picture 2" descr="C:\Users\cwellman\AppData\Roaming\PixelMetrics\CaptureWiz\Temp\80.png"/>
-          <p:cNvPicPr>
-            <a:picLocks noChangeAspect="1" noChangeArrowheads="1"/>
-          </p:cNvPicPr>
-          <p:nvPr/>
-        </p:nvPicPr>
-        <p:blipFill>
-          <a:blip r:embed="rId2">
-            <a:extLst>
-              <a:ext uri="{28A0092B-C50C-407E-A947-70E740481C1C}">
-                <a14:useLocalDpi xmlns:a14="http://schemas.microsoft.com/office/drawing/2010/main" val="0"/>
-              </a:ext>
-            </a:extLst>
-          </a:blip>
-          <a:srcRect/>
-          <a:stretch>
-            <a:fillRect/>
-          </a:stretch>
-        </p:blipFill>
-        <p:spPr bwMode="auto">
-          <a:xfrm>
-            <a:off x="434543" y="216786"/>
-            <a:ext cx="6151099" cy="7919823"/>
-          </a:xfrm>
-          <a:prstGeom prst="rect">
-            <a:avLst/>
-          </a:prstGeom>
-          <a:noFill/>
-          <a:extLst>
-            <a:ext uri="{909E8E84-426E-40DD-AFC4-6F175D3DCCD1}">
-              <a14:hiddenFill xmlns:a14="http://schemas.microsoft.com/office/drawing/2010/main">
-                <a:solidFill>
-                  <a:srgbClr val="FFFFFF"/>
-                </a:solidFill>
-              </a14:hiddenFill>
-            </a:ext>
-          </a:extLst>
-        </p:spPr>
-      </p:pic>
-    </p:spTree>
-    <p:extLst>
-      <p:ext uri="{BB962C8B-B14F-4D97-AF65-F5344CB8AC3E}">
-        <p14:creationId xmlns:p14="http://schemas.microsoft.com/office/powerpoint/2010/main" val="995658205"/>
-      </p:ext>
-    </p:extLst>
-  </p:cSld>
-  <p:clrMapOvr>
-    <a:masterClrMapping/>
-  </p:clrMapOvr>
-</p:sld>
-</file>
-
-<file path=ppt/slides/slide12.xml><?xml version="1.0" encoding="utf-8"?>
-<p:sld xmlns:a="http://schemas.openxmlformats.org/drawingml/2006/main" xmlns:r="http://schemas.openxmlformats.org/officeDocument/2006/relationships" xmlns:p="http://schemas.openxmlformats.org/presentationml/2006/main">
-  <p:cSld>
-    <p:spTree>
-      <p:nvGrpSpPr>
-        <p:cNvPr id="1" name=""/>
-        <p:cNvGrpSpPr/>
-        <p:nvPr/>
-      </p:nvGrpSpPr>
-      <p:grpSpPr>
-        <a:xfrm>
-          <a:off x="0" y="0"/>
-          <a:ext cx="0" cy="0"/>
-          <a:chOff x="0" y="0"/>
-          <a:chExt cx="0" cy="0"/>
-        </a:xfrm>
-      </p:grpSpPr>
-      <p:pic>
-        <p:nvPicPr>
-          <p:cNvPr id="8194" name="Picture 2" descr="C:\Users\cwellman\AppData\Roaming\PixelMetrics\CaptureWiz\Temp\81.png"/>
-          <p:cNvPicPr>
-            <a:picLocks noChangeAspect="1" noChangeArrowheads="1"/>
-          </p:cNvPicPr>
-          <p:nvPr/>
-        </p:nvPicPr>
-        <p:blipFill>
-          <a:blip r:embed="rId2">
-            <a:extLst>
-              <a:ext uri="{28A0092B-C50C-407E-A947-70E740481C1C}">
-                <a14:useLocalDpi xmlns:a14="http://schemas.microsoft.com/office/drawing/2010/main" val="0"/>
-              </a:ext>
-            </a:extLst>
-          </a:blip>
-          <a:srcRect/>
-          <a:stretch>
-            <a:fillRect/>
-          </a:stretch>
-        </p:blipFill>
-        <p:spPr bwMode="auto">
-          <a:xfrm>
-            <a:off x="295059" y="175001"/>
-            <a:ext cx="5995180" cy="8426558"/>
-          </a:xfrm>
-          <a:prstGeom prst="rect">
-            <a:avLst/>
-          </a:prstGeom>
-          <a:noFill/>
-          <a:extLst>
-            <a:ext uri="{909E8E84-426E-40DD-AFC4-6F175D3DCCD1}">
-              <a14:hiddenFill xmlns:a14="http://schemas.microsoft.com/office/drawing/2010/main">
-                <a:solidFill>
-                  <a:srgbClr val="FFFFFF"/>
-                </a:solidFill>
-              </a14:hiddenFill>
-            </a:ext>
-          </a:extLst>
-        </p:spPr>
-      </p:pic>
-    </p:spTree>
-    <p:extLst>
-      <p:ext uri="{BB962C8B-B14F-4D97-AF65-F5344CB8AC3E}">
-        <p14:creationId xmlns:p14="http://schemas.microsoft.com/office/powerpoint/2010/main" val="3126476502"/>
-      </p:ext>
-    </p:extLst>
-  </p:cSld>
-  <p:clrMapOvr>
-    <a:masterClrMapping/>
-  </p:clrMapOvr>
-</p:sld>
-</file>
-
-<file path=ppt/slides/slide13.xml><?xml version="1.0" encoding="utf-8"?>
-<p:sld xmlns:a="http://schemas.openxmlformats.org/drawingml/2006/main" xmlns:r="http://schemas.openxmlformats.org/officeDocument/2006/relationships" xmlns:p="http://schemas.openxmlformats.org/presentationml/2006/main">
-  <p:cSld>
-    <p:spTree>
-      <p:nvGrpSpPr>
-        <p:cNvPr id="1" name=""/>
-        <p:cNvGrpSpPr/>
-        <p:nvPr/>
-      </p:nvGrpSpPr>
-      <p:grpSpPr>
-        <a:xfrm>
-          <a:off x="0" y="0"/>
-          <a:ext cx="0" cy="0"/>
-          <a:chOff x="0" y="0"/>
-          <a:chExt cx="0" cy="0"/>
-        </a:xfrm>
-      </p:grpSpPr>
-      <p:pic>
-        <p:nvPicPr>
-          <p:cNvPr id="9218" name="Picture 2" descr="C:\Users\cwellman\AppData\Roaming\PixelMetrics\CaptureWiz\Temp\82.png"/>
-          <p:cNvPicPr>
-            <a:picLocks noChangeAspect="1" noChangeArrowheads="1"/>
-          </p:cNvPicPr>
-          <p:nvPr/>
-        </p:nvPicPr>
-        <p:blipFill>
-          <a:blip r:embed="rId2">
-            <a:extLst>
-              <a:ext uri="{28A0092B-C50C-407E-A947-70E740481C1C}">
-                <a14:useLocalDpi xmlns:a14="http://schemas.microsoft.com/office/drawing/2010/main" val="0"/>
-              </a:ext>
-            </a:extLst>
-          </a:blip>
-          <a:srcRect/>
-          <a:stretch>
-            <a:fillRect/>
-          </a:stretch>
-        </p:blipFill>
-        <p:spPr bwMode="auto">
-          <a:xfrm>
-            <a:off x="140077" y="146965"/>
-            <a:ext cx="5893639" cy="8470093"/>
-          </a:xfrm>
-          <a:prstGeom prst="rect">
-            <a:avLst/>
-          </a:prstGeom>
-          <a:noFill/>
-          <a:extLst>
-            <a:ext uri="{909E8E84-426E-40DD-AFC4-6F175D3DCCD1}">
-              <a14:hiddenFill xmlns:a14="http://schemas.microsoft.com/office/drawing/2010/main">
-                <a:solidFill>
-                  <a:srgbClr val="FFFFFF"/>
-                </a:solidFill>
-              </a14:hiddenFill>
-            </a:ext>
-          </a:extLst>
-        </p:spPr>
-      </p:pic>
-    </p:spTree>
-    <p:extLst>
-      <p:ext uri="{BB962C8B-B14F-4D97-AF65-F5344CB8AC3E}">
-        <p14:creationId xmlns:p14="http://schemas.microsoft.com/office/powerpoint/2010/main" val="200413500"/>
-      </p:ext>
-    </p:extLst>
-  </p:cSld>
-  <p:clrMapOvr>
-    <a:masterClrMapping/>
-  </p:clrMapOvr>
-</p:sld>
-</file>
-
-<file path=ppt/slides/slide14.xml><?xml version="1.0" encoding="utf-8"?>
-<p:sld xmlns:a="http://schemas.openxmlformats.org/drawingml/2006/main" xmlns:r="http://schemas.openxmlformats.org/officeDocument/2006/relationships" xmlns:p="http://schemas.openxmlformats.org/presentationml/2006/main">
-  <p:cSld>
-    <p:spTree>
-      <p:nvGrpSpPr>
-        <p:cNvPr id="1" name=""/>
-        <p:cNvGrpSpPr/>
-        <p:nvPr/>
-      </p:nvGrpSpPr>
-      <p:grpSpPr>
-        <a:xfrm>
-          <a:off x="0" y="0"/>
-          <a:ext cx="0" cy="0"/>
-          <a:chOff x="0" y="0"/>
-          <a:chExt cx="0" cy="0"/>
-        </a:xfrm>
-      </p:grpSpPr>
-      <p:pic>
-        <p:nvPicPr>
-          <p:cNvPr id="10242" name="Picture 2" descr="C:\Users\cwellman\AppData\Roaming\PixelMetrics\CaptureWiz\Temp\83.png"/>
-          <p:cNvPicPr>
-            <a:picLocks noChangeAspect="1" noChangeArrowheads="1"/>
-          </p:cNvPicPr>
-          <p:nvPr/>
-        </p:nvPicPr>
-        <p:blipFill>
-          <a:blip r:embed="rId2">
-            <a:extLst>
-              <a:ext uri="{28A0092B-C50C-407E-A947-70E740481C1C}">
-                <a14:useLocalDpi xmlns:a14="http://schemas.microsoft.com/office/drawing/2010/main" val="0"/>
-              </a:ext>
-            </a:extLst>
-          </a:blip>
-          <a:srcRect/>
-          <a:stretch>
-            <a:fillRect/>
-          </a:stretch>
-        </p:blipFill>
-        <p:spPr bwMode="auto">
-          <a:xfrm>
-            <a:off x="124577" y="155439"/>
-            <a:ext cx="6483031" cy="8647597"/>
-          </a:xfrm>
-          <a:prstGeom prst="rect">
-            <a:avLst/>
-          </a:prstGeom>
-          <a:noFill/>
-          <a:extLst>
-            <a:ext uri="{909E8E84-426E-40DD-AFC4-6F175D3DCCD1}">
-              <a14:hiddenFill xmlns:a14="http://schemas.microsoft.com/office/drawing/2010/main">
-                <a:solidFill>
-                  <a:srgbClr val="FFFFFF"/>
-                </a:solidFill>
-              </a14:hiddenFill>
-            </a:ext>
-          </a:extLst>
-        </p:spPr>
-      </p:pic>
-    </p:spTree>
-    <p:extLst>
-      <p:ext uri="{BB962C8B-B14F-4D97-AF65-F5344CB8AC3E}">
-        <p14:creationId xmlns:p14="http://schemas.microsoft.com/office/powerpoint/2010/main" val="2400225567"/>
-      </p:ext>
-    </p:extLst>
-  </p:cSld>
-  <p:clrMapOvr>
-    <a:masterClrMapping/>
-  </p:clrMapOvr>
-</p:sld>
-</file>
-
-<file path=ppt/slides/slide15.xml><?xml version="1.0" encoding="utf-8"?>
-<p:sld xmlns:a="http://schemas.openxmlformats.org/drawingml/2006/main" xmlns:r="http://schemas.openxmlformats.org/officeDocument/2006/relationships" xmlns:p="http://schemas.openxmlformats.org/presentationml/2006/main">
-  <p:cSld>
-    <p:spTree>
-      <p:nvGrpSpPr>
-        <p:cNvPr id="1" name=""/>
-        <p:cNvGrpSpPr/>
-        <p:nvPr/>
-      </p:nvGrpSpPr>
-      <p:grpSpPr>
-        <a:xfrm>
-          <a:off x="0" y="0"/>
-          <a:ext cx="0" cy="0"/>
-          <a:chOff x="0" y="0"/>
-          <a:chExt cx="0" cy="0"/>
-        </a:xfrm>
-      </p:grpSpPr>
-      <p:sp>
-        <p:nvSpPr>
-          <p:cNvPr id="4" name="TextBox 3"/>
+      <p:sp>
+        <p:nvSpPr>
+          <p:cNvPr id="2" name="TextBox 1"/>
           <p:cNvSpPr txBox="1"/>
           <p:nvPr/>
         </p:nvSpPr>
         <p:spPr>
           <a:xfrm>
-            <a:off x="573437" y="573437"/>
-            <a:ext cx="5470902" cy="1200329"/>
+            <a:off x="464949" y="542441"/>
+            <a:ext cx="1699504" cy="646331"/>
           </a:xfrm>
           <a:prstGeom prst="rect">
             <a:avLst/>
@@ -3501,32 +3248,24 @@
           <a:noFill/>
         </p:spPr>
         <p:txBody>
-          <a:bodyPr wrap="square" rtlCol="0">
+          <a:bodyPr wrap="none" rtlCol="0">
             <a:spAutoFit/>
           </a:bodyPr>
           <a:lstStyle/>
           <a:p>
             <a:r>
               <a:rPr lang="en-US" dirty="0"/>
-              <a:t>WS ch5_6</a:t>
-            </a:r>
-          </a:p>
-          <a:p>
-            <a:r>
-              <a:rPr lang="en-US" dirty="0"/>
-              <a:t>Make a truth table for</a:t>
-            </a:r>
-          </a:p>
-          <a:p>
-            <a:r>
-              <a:rPr lang="en-US" dirty="0"/>
-              <a:t>not(x and y)       &amp;       (not x) or (not y)</a:t>
-            </a:r>
-          </a:p>
-          <a:p>
-            <a:r>
-              <a:rPr lang="en-US" dirty="0"/>
-              <a:t>and show that they are equivalent.</a:t>
+              <a:t>HW: 1,2,6,10,12</a:t>
+            </a:r>
+          </a:p>
+          <a:p>
+            <a:r>
+              <a:rPr lang="en-US" dirty="0" err="1"/>
+              <a:t>Youtube</a:t>
+            </a:r>
+            <a:r>
+              <a:rPr lang="en-US" dirty="0"/>
+              <a:t>: 8</a:t>
             </a:r>
           </a:p>
         </p:txBody>
@@ -3534,562 +3273,7 @@
     </p:spTree>
     <p:extLst>
       <p:ext uri="{BB962C8B-B14F-4D97-AF65-F5344CB8AC3E}">
-        <p14:creationId xmlns:p14="http://schemas.microsoft.com/office/powerpoint/2010/main" val="1450854266"/>
-      </p:ext>
-    </p:extLst>
-  </p:cSld>
-  <p:clrMapOvr>
-    <a:masterClrMapping/>
-  </p:clrMapOvr>
-</p:sld>
-</file>
-
-<file path=ppt/slides/slide16.xml><?xml version="1.0" encoding="utf-8"?>
-<p:sld xmlns:a="http://schemas.openxmlformats.org/drawingml/2006/main" xmlns:r="http://schemas.openxmlformats.org/officeDocument/2006/relationships" xmlns:p="http://schemas.openxmlformats.org/presentationml/2006/main">
-  <p:cSld>
-    <p:spTree>
-      <p:nvGrpSpPr>
-        <p:cNvPr id="1" name=""/>
-        <p:cNvGrpSpPr/>
-        <p:nvPr/>
-      </p:nvGrpSpPr>
-      <p:grpSpPr>
-        <a:xfrm>
-          <a:off x="0" y="0"/>
-          <a:ext cx="0" cy="0"/>
-          <a:chOff x="0" y="0"/>
-          <a:chExt cx="0" cy="0"/>
-        </a:xfrm>
-      </p:grpSpPr>
-      <p:pic>
-        <p:nvPicPr>
-          <p:cNvPr id="11266" name="Picture 2" descr="C:\Users\cwellman\AppData\Roaming\PixelMetrics\CaptureWiz\Temp\84.png"/>
-          <p:cNvPicPr>
-            <a:picLocks noChangeAspect="1" noChangeArrowheads="1"/>
-          </p:cNvPicPr>
-          <p:nvPr/>
-        </p:nvPicPr>
-        <p:blipFill>
-          <a:blip r:embed="rId2">
-            <a:extLst>
-              <a:ext uri="{28A0092B-C50C-407E-A947-70E740481C1C}">
-                <a14:useLocalDpi xmlns:a14="http://schemas.microsoft.com/office/drawing/2010/main" val="0"/>
-              </a:ext>
-            </a:extLst>
-          </a:blip>
-          <a:srcRect/>
-          <a:stretch>
-            <a:fillRect/>
-          </a:stretch>
-        </p:blipFill>
-        <p:spPr bwMode="auto">
-          <a:xfrm>
-            <a:off x="109080" y="0"/>
-            <a:ext cx="6368996" cy="8834034"/>
-          </a:xfrm>
-          <a:prstGeom prst="rect">
-            <a:avLst/>
-          </a:prstGeom>
-          <a:noFill/>
-          <a:extLst>
-            <a:ext uri="{909E8E84-426E-40DD-AFC4-6F175D3DCCD1}">
-              <a14:hiddenFill xmlns:a14="http://schemas.microsoft.com/office/drawing/2010/main">
-                <a:solidFill>
-                  <a:srgbClr val="FFFFFF"/>
-                </a:solidFill>
-              </a14:hiddenFill>
-            </a:ext>
-          </a:extLst>
-        </p:spPr>
-      </p:pic>
-    </p:spTree>
-    <p:extLst>
-      <p:ext uri="{BB962C8B-B14F-4D97-AF65-F5344CB8AC3E}">
-        <p14:creationId xmlns:p14="http://schemas.microsoft.com/office/powerpoint/2010/main" val="3457248705"/>
-      </p:ext>
-    </p:extLst>
-  </p:cSld>
-  <p:clrMapOvr>
-    <a:masterClrMapping/>
-  </p:clrMapOvr>
-</p:sld>
-</file>
-
-<file path=ppt/slides/slide17.xml><?xml version="1.0" encoding="utf-8"?>
-<p:sld xmlns:a="http://schemas.openxmlformats.org/drawingml/2006/main" xmlns:r="http://schemas.openxmlformats.org/officeDocument/2006/relationships" xmlns:p="http://schemas.openxmlformats.org/presentationml/2006/main">
-  <p:cSld>
-    <p:spTree>
-      <p:nvGrpSpPr>
-        <p:cNvPr id="1" name=""/>
-        <p:cNvGrpSpPr/>
-        <p:nvPr/>
-      </p:nvGrpSpPr>
-      <p:grpSpPr>
-        <a:xfrm>
-          <a:off x="0" y="0"/>
-          <a:ext cx="0" cy="0"/>
-          <a:chOff x="0" y="0"/>
-          <a:chExt cx="0" cy="0"/>
-        </a:xfrm>
-      </p:grpSpPr>
-      <p:sp>
-        <p:nvSpPr>
-          <p:cNvPr id="4" name="TextBox 3"/>
-          <p:cNvSpPr txBox="1"/>
-          <p:nvPr/>
-        </p:nvSpPr>
-        <p:spPr>
-          <a:xfrm>
-            <a:off x="0" y="294467"/>
-            <a:ext cx="6338082" cy="4278094"/>
-          </a:xfrm>
-          <a:prstGeom prst="rect">
-            <a:avLst/>
-          </a:prstGeom>
-          <a:noFill/>
-        </p:spPr>
-        <p:txBody>
-          <a:bodyPr wrap="none" rtlCol="0">
-            <a:spAutoFit/>
-          </a:bodyPr>
-          <a:lstStyle/>
-          <a:p>
-            <a:r>
-              <a:rPr lang="en-US" sz="1600" dirty="0"/>
-              <a:t>WS ch5_7</a:t>
-            </a:r>
-          </a:p>
-          <a:p>
-            <a:r>
-              <a:rPr lang="en-US" sz="1600" dirty="0"/>
-              <a:t>Example of a function that returns 2 items:</a:t>
-            </a:r>
-          </a:p>
-          <a:p>
-            <a:endParaRPr lang="en-US" sz="1600" dirty="0"/>
-          </a:p>
-          <a:p>
-            <a:r>
-              <a:rPr lang="en-US" sz="1600" dirty="0" err="1"/>
-              <a:t>def</a:t>
-            </a:r>
-            <a:r>
-              <a:rPr lang="en-US" sz="1600" dirty="0"/>
-              <a:t> </a:t>
-            </a:r>
-            <a:r>
-              <a:rPr lang="en-US" sz="1600" dirty="0" err="1"/>
-              <a:t>sum_diff</a:t>
-            </a:r>
-            <a:r>
-              <a:rPr lang="en-US" sz="1600" dirty="0"/>
-              <a:t>(</a:t>
-            </a:r>
-            <a:r>
-              <a:rPr lang="en-US" sz="1600" dirty="0" err="1"/>
-              <a:t>x,y</a:t>
-            </a:r>
-            <a:r>
-              <a:rPr lang="en-US" sz="1600" dirty="0"/>
-              <a:t>):</a:t>
-            </a:r>
-          </a:p>
-          <a:p>
-            <a:r>
-              <a:rPr lang="en-US" sz="1600" dirty="0"/>
-              <a:t>    '''Returns sum and difference of x and y.'''</a:t>
-            </a:r>
-          </a:p>
-          <a:p>
-            <a:r>
-              <a:rPr lang="en-US" sz="1600" dirty="0"/>
-              <a:t>    Sum = x + y</a:t>
-            </a:r>
-          </a:p>
-          <a:p>
-            <a:r>
-              <a:rPr lang="en-US" sz="1600" dirty="0"/>
-              <a:t>    Diff = x - y</a:t>
-            </a:r>
-          </a:p>
-          <a:p>
-            <a:r>
-              <a:rPr lang="en-US" sz="1600" dirty="0"/>
-              <a:t>    return Sum, Diff</a:t>
-            </a:r>
-          </a:p>
-          <a:p>
-            <a:endParaRPr lang="en-US" sz="1600" dirty="0"/>
-          </a:p>
-          <a:p>
-            <a:r>
-              <a:rPr lang="en-US" sz="1600" dirty="0"/>
-              <a:t>##How to use it:</a:t>
-            </a:r>
-          </a:p>
-          <a:p>
-            <a:endParaRPr lang="en-US" sz="1600" dirty="0"/>
-          </a:p>
-          <a:p>
-            <a:r>
-              <a:rPr lang="en-US" sz="1600" dirty="0"/>
-              <a:t>S,D = </a:t>
-            </a:r>
-            <a:r>
-              <a:rPr lang="en-US" sz="1600" dirty="0" err="1"/>
-              <a:t>sum_diff</a:t>
-            </a:r>
-            <a:r>
-              <a:rPr lang="en-US" sz="1600" dirty="0"/>
-              <a:t>(5,3)</a:t>
-            </a:r>
-          </a:p>
-          <a:p>
-            <a:endParaRPr lang="en-US" sz="1600" dirty="0"/>
-          </a:p>
-          <a:p>
-            <a:r>
-              <a:rPr lang="en-US" sz="1600" dirty="0"/>
-              <a:t>print(S,D)</a:t>
-            </a:r>
-          </a:p>
-          <a:p>
-            <a:endParaRPr lang="en-US" sz="1600" dirty="0"/>
-          </a:p>
-          <a:p>
-            <a:r>
-              <a:rPr lang="en-US" sz="1600" dirty="0"/>
-              <a:t>Write a function, </a:t>
-            </a:r>
-            <a:r>
-              <a:rPr lang="en-US" sz="1600" dirty="0" err="1"/>
-              <a:t>sumSqrs_diffSqrs</a:t>
-            </a:r>
-            <a:r>
-              <a:rPr lang="en-US" sz="1600" dirty="0"/>
-              <a:t>(</a:t>
-            </a:r>
-            <a:r>
-              <a:rPr lang="en-US" sz="1600" dirty="0" err="1"/>
-              <a:t>x,y</a:t>
-            </a:r>
-            <a:r>
-              <a:rPr lang="en-US" sz="1600" dirty="0"/>
-              <a:t>), which returns x^2 + y^2  and</a:t>
-            </a:r>
-          </a:p>
-          <a:p>
-            <a:r>
-              <a:rPr lang="en-US" sz="1600" dirty="0"/>
-              <a:t>x^2 - y^2.  Use </a:t>
-            </a:r>
-            <a:r>
-              <a:rPr lang="en-US" sz="1600" dirty="0" err="1"/>
-              <a:t>sumSqrs_diffSqrs</a:t>
-            </a:r>
-            <a:r>
-              <a:rPr lang="en-US" sz="1600" dirty="0"/>
-              <a:t>(</a:t>
-            </a:r>
-            <a:r>
-              <a:rPr lang="en-US" sz="1600" dirty="0" err="1"/>
-              <a:t>x,y</a:t>
-            </a:r>
-            <a:r>
-              <a:rPr lang="en-US" sz="1600" dirty="0"/>
-              <a:t>) to compute 4^2 + 2^2 and 4^2 - 2^2.</a:t>
-            </a:r>
-          </a:p>
-        </p:txBody>
-      </p:sp>
-    </p:spTree>
-    <p:extLst>
-      <p:ext uri="{BB962C8B-B14F-4D97-AF65-F5344CB8AC3E}">
-        <p14:creationId xmlns:p14="http://schemas.microsoft.com/office/powerpoint/2010/main" val="3516291907"/>
-      </p:ext>
-    </p:extLst>
-  </p:cSld>
-  <p:clrMapOvr>
-    <a:masterClrMapping/>
-  </p:clrMapOvr>
-</p:sld>
-</file>
-
-<file path=ppt/slides/slide18.xml><?xml version="1.0" encoding="utf-8"?>
-<p:sld xmlns:a="http://schemas.openxmlformats.org/drawingml/2006/main" xmlns:r="http://schemas.openxmlformats.org/officeDocument/2006/relationships" xmlns:p="http://schemas.openxmlformats.org/presentationml/2006/main">
-  <p:cSld>
-    <p:spTree>
-      <p:nvGrpSpPr>
-        <p:cNvPr id="1" name=""/>
-        <p:cNvGrpSpPr/>
-        <p:nvPr/>
-      </p:nvGrpSpPr>
-      <p:grpSpPr>
-        <a:xfrm>
-          <a:off x="0" y="0"/>
-          <a:ext cx="0" cy="0"/>
-          <a:chOff x="0" y="0"/>
-          <a:chExt cx="0" cy="0"/>
-        </a:xfrm>
-      </p:grpSpPr>
-      <p:sp>
-        <p:nvSpPr>
-          <p:cNvPr id="4" name="TextBox 3"/>
-          <p:cNvSpPr txBox="1"/>
-          <p:nvPr/>
-        </p:nvSpPr>
-        <p:spPr>
-          <a:xfrm>
-            <a:off x="170482" y="371959"/>
-            <a:ext cx="6205866" cy="5909310"/>
-          </a:xfrm>
-          <a:prstGeom prst="rect">
-            <a:avLst/>
-          </a:prstGeom>
-          <a:noFill/>
-        </p:spPr>
-        <p:txBody>
-          <a:bodyPr wrap="none" rtlCol="0">
-            <a:spAutoFit/>
-          </a:bodyPr>
-          <a:lstStyle/>
-          <a:p>
-            <a:r>
-              <a:rPr lang="en-US" dirty="0"/>
-              <a:t>WS ch5_8</a:t>
-            </a:r>
-          </a:p>
-          <a:p>
-            <a:r>
-              <a:rPr lang="en-US" dirty="0"/>
-              <a:t>Items can be added to a list using the append method:</a:t>
-            </a:r>
-          </a:p>
-          <a:p>
-            <a:r>
-              <a:rPr lang="en-US" dirty="0"/>
-              <a:t>L = [] ## empty list</a:t>
-            </a:r>
-          </a:p>
-          <a:p>
-            <a:r>
-              <a:rPr lang="en-US" dirty="0"/>
-              <a:t>print(L)</a:t>
-            </a:r>
-          </a:p>
-          <a:p>
-            <a:r>
-              <a:rPr lang="en-US" dirty="0" err="1"/>
-              <a:t>L.append</a:t>
-            </a:r>
-            <a:r>
-              <a:rPr lang="en-US" dirty="0"/>
-              <a:t>(2)</a:t>
-            </a:r>
-          </a:p>
-          <a:p>
-            <a:r>
-              <a:rPr lang="en-US" dirty="0"/>
-              <a:t>print(L)</a:t>
-            </a:r>
-          </a:p>
-          <a:p>
-            <a:r>
-              <a:rPr lang="en-US" dirty="0" err="1"/>
-              <a:t>L.append</a:t>
-            </a:r>
-            <a:r>
-              <a:rPr lang="en-US" dirty="0"/>
-              <a:t>('dog')</a:t>
-            </a:r>
-          </a:p>
-          <a:p>
-            <a:r>
-              <a:rPr lang="en-US" dirty="0"/>
-              <a:t>print(L)</a:t>
-            </a:r>
-          </a:p>
-          <a:p>
-            <a:endParaRPr lang="en-US" dirty="0"/>
-          </a:p>
-          <a:p>
-            <a:r>
-              <a:rPr lang="en-US" dirty="0"/>
-              <a:t>&gt;&gt;&gt; </a:t>
-            </a:r>
-          </a:p>
-          <a:p>
-            <a:r>
-              <a:rPr lang="en-US" dirty="0"/>
-              <a:t>[]</a:t>
-            </a:r>
-          </a:p>
-          <a:p>
-            <a:r>
-              <a:rPr lang="en-US" dirty="0"/>
-              <a:t>[2]</a:t>
-            </a:r>
-          </a:p>
-          <a:p>
-            <a:r>
-              <a:rPr lang="en-US" dirty="0"/>
-              <a:t>[2, 'dog']</a:t>
-            </a:r>
-          </a:p>
-          <a:p>
-            <a:r>
-              <a:rPr lang="en-US" dirty="0"/>
-              <a:t>&gt;&gt;&gt; </a:t>
-            </a:r>
-          </a:p>
-          <a:p>
-            <a:endParaRPr lang="en-US" dirty="0"/>
-          </a:p>
-          <a:p>
-            <a:r>
-              <a:rPr lang="en-US" dirty="0"/>
-              <a:t>Write a function, </a:t>
-            </a:r>
-            <a:r>
-              <a:rPr lang="en-US" dirty="0" err="1"/>
-              <a:t>sep_ints_and_strgs</a:t>
-            </a:r>
-            <a:r>
-              <a:rPr lang="en-US" dirty="0"/>
-              <a:t>(L),  which takes a list, L,</a:t>
-            </a:r>
-          </a:p>
-          <a:p>
-            <a:r>
-              <a:rPr lang="en-US" dirty="0"/>
-              <a:t>of </a:t>
-            </a:r>
-            <a:r>
-              <a:rPr lang="en-US" dirty="0" err="1"/>
-              <a:t>ints</a:t>
-            </a:r>
-            <a:r>
-              <a:rPr lang="en-US" dirty="0"/>
-              <a:t> and strings, as a parameter, and which returns 2 lists, one</a:t>
-            </a:r>
-          </a:p>
-          <a:p>
-            <a:r>
-              <a:rPr lang="en-US" dirty="0"/>
-              <a:t>containing the </a:t>
-            </a:r>
-            <a:r>
-              <a:rPr lang="en-US" dirty="0" err="1"/>
-              <a:t>ints</a:t>
-            </a:r>
-            <a:r>
-              <a:rPr lang="en-US" dirty="0"/>
-              <a:t> from L and the other containing the strings</a:t>
-            </a:r>
-          </a:p>
-          <a:p>
-            <a:r>
-              <a:rPr lang="en-US" dirty="0"/>
-              <a:t>from L.  Use this function to process the list</a:t>
-            </a:r>
-          </a:p>
-          <a:p>
-            <a:r>
-              <a:rPr lang="en-US" dirty="0"/>
-              <a:t>['dog', 3, 7,2,'cat','5']</a:t>
-            </a:r>
-          </a:p>
-          <a:p>
-            <a:r>
-              <a:rPr lang="en-US" dirty="0"/>
-              <a:t>and print out a list of </a:t>
-            </a:r>
-            <a:r>
-              <a:rPr lang="en-US" dirty="0" err="1"/>
-              <a:t>ints</a:t>
-            </a:r>
-            <a:r>
-              <a:rPr lang="en-US" dirty="0"/>
-              <a:t> and a list of strings.</a:t>
-            </a:r>
-          </a:p>
-        </p:txBody>
-      </p:sp>
-    </p:spTree>
-    <p:extLst>
-      <p:ext uri="{BB962C8B-B14F-4D97-AF65-F5344CB8AC3E}">
-        <p14:creationId xmlns:p14="http://schemas.microsoft.com/office/powerpoint/2010/main" val="4007173900"/>
-      </p:ext>
-    </p:extLst>
-  </p:cSld>
-  <p:clrMapOvr>
-    <a:masterClrMapping/>
-  </p:clrMapOvr>
-</p:sld>
-</file>
-
-<file path=ppt/slides/slide19.xml><?xml version="1.0" encoding="utf-8"?>
-<p:sld xmlns:a="http://schemas.openxmlformats.org/drawingml/2006/main" xmlns:r="http://schemas.openxmlformats.org/officeDocument/2006/relationships" xmlns:p="http://schemas.openxmlformats.org/presentationml/2006/main">
-  <p:cSld>
-    <p:spTree>
-      <p:nvGrpSpPr>
-        <p:cNvPr id="1" name=""/>
-        <p:cNvGrpSpPr/>
-        <p:nvPr/>
-      </p:nvGrpSpPr>
-      <p:grpSpPr>
-        <a:xfrm>
-          <a:off x="0" y="0"/>
-          <a:ext cx="0" cy="0"/>
-          <a:chOff x="0" y="0"/>
-          <a:chExt cx="0" cy="0"/>
-        </a:xfrm>
-      </p:grpSpPr>
-      <p:pic>
-        <p:nvPicPr>
-          <p:cNvPr id="12290" name="Picture 2" descr="C:\Users\cwellman\AppData\Roaming\PixelMetrics\CaptureWiz\Temp\85.png"/>
-          <p:cNvPicPr>
-            <a:picLocks noChangeAspect="1" noChangeArrowheads="1"/>
-          </p:cNvPicPr>
-          <p:nvPr/>
-        </p:nvPicPr>
-        <p:blipFill>
-          <a:blip r:embed="rId2">
-            <a:extLst>
-              <a:ext uri="{28A0092B-C50C-407E-A947-70E740481C1C}">
-                <a14:useLocalDpi xmlns:a14="http://schemas.microsoft.com/office/drawing/2010/main" val="0"/>
-              </a:ext>
-            </a:extLst>
-          </a:blip>
-          <a:srcRect/>
-          <a:stretch>
-            <a:fillRect/>
-          </a:stretch>
-        </p:blipFill>
-        <p:spPr bwMode="auto">
-          <a:xfrm>
-            <a:off x="202069" y="171315"/>
-            <a:ext cx="6784813" cy="7174882"/>
-          </a:xfrm>
-          <a:prstGeom prst="rect">
-            <a:avLst/>
-          </a:prstGeom>
-          <a:noFill/>
-          <a:extLst>
-            <a:ext uri="{909E8E84-426E-40DD-AFC4-6F175D3DCCD1}">
-              <a14:hiddenFill xmlns:a14="http://schemas.microsoft.com/office/drawing/2010/main">
-                <a:solidFill>
-                  <a:srgbClr val="FFFFFF"/>
-                </a:solidFill>
-              </a14:hiddenFill>
-            </a:ext>
-          </a:extLst>
-        </p:spPr>
-      </p:pic>
-    </p:spTree>
-    <p:extLst>
-      <p:ext uri="{BB962C8B-B14F-4D97-AF65-F5344CB8AC3E}">
-        <p14:creationId xmlns:p14="http://schemas.microsoft.com/office/powerpoint/2010/main" val="2677827097"/>
+        <p14:creationId xmlns:p14="http://schemas.microsoft.com/office/powerpoint/2010/main" val="1216958690"/>
       </p:ext>
     </p:extLst>
   </p:cSld>
@@ -4116,51 +3300,51 @@
           <a:chExt cx="0" cy="0"/>
         </a:xfrm>
       </p:grpSpPr>
-      <p:pic>
-        <p:nvPicPr>
-          <p:cNvPr id="2050" name="Picture 2" descr="C:\Users\cwellman\AppData\Roaming\PixelMetrics\CaptureWiz\Temp\75.png"/>
-          <p:cNvPicPr>
-            <a:picLocks noChangeAspect="1" noChangeArrowheads="1"/>
-          </p:cNvPicPr>
+      <p:sp>
+        <p:nvSpPr>
+          <p:cNvPr id="4" name="TextBox 3"/>
+          <p:cNvSpPr txBox="1"/>
           <p:nvPr/>
-        </p:nvPicPr>
-        <p:blipFill>
-          <a:blip r:embed="rId2">
-            <a:extLst>
-              <a:ext uri="{28A0092B-C50C-407E-A947-70E740481C1C}">
-                <a14:useLocalDpi xmlns:a14="http://schemas.microsoft.com/office/drawing/2010/main" val="0"/>
-              </a:ext>
-            </a:extLst>
-          </a:blip>
-          <a:srcRect/>
-          <a:stretch>
-            <a:fillRect/>
-          </a:stretch>
-        </p:blipFill>
-        <p:spPr bwMode="auto">
+        </p:nvSpPr>
+        <p:spPr>
           <a:xfrm>
-            <a:off x="171074" y="294468"/>
-            <a:ext cx="5724408" cy="8570563"/>
+            <a:off x="0" y="-1"/>
+            <a:ext cx="6858000" cy="1477328"/>
           </a:xfrm>
           <a:prstGeom prst="rect">
             <a:avLst/>
           </a:prstGeom>
           <a:noFill/>
-          <a:extLst>
-            <a:ext uri="{909E8E84-426E-40DD-AFC4-6F175D3DCCD1}">
-              <a14:hiddenFill xmlns:a14="http://schemas.microsoft.com/office/drawing/2010/main">
-                <a:solidFill>
-                  <a:srgbClr val="FFFFFF"/>
-                </a:solidFill>
-              </a14:hiddenFill>
-            </a:ext>
-          </a:extLst>
         </p:spPr>
-      </p:pic>
+        <p:txBody>
+          <a:bodyPr wrap="square" rtlCol="0">
+            <a:spAutoFit/>
+          </a:bodyPr>
+          <a:lstStyle/>
+          <a:p>
+            <a:r>
+              <a:rPr lang="en-US" dirty="0"/>
+              <a:t>WS ch5_2</a:t>
+            </a:r>
+          </a:p>
+          <a:p>
+            <a:r>
+              <a:rPr lang="en-US" dirty="0"/>
+              <a:t>Make a truth table for p and (q or r).  How many rows will the table have?</a:t>
+            </a:r>
+          </a:p>
+          <a:p>
+            <a:endParaRPr lang="en-US" dirty="0"/>
+          </a:p>
+          <a:p>
+            <a:endParaRPr lang="en-US" dirty="0"/>
+          </a:p>
+        </p:txBody>
+      </p:sp>
     </p:spTree>
     <p:extLst>
       <p:ext uri="{BB962C8B-B14F-4D97-AF65-F5344CB8AC3E}">
-        <p14:creationId xmlns:p14="http://schemas.microsoft.com/office/powerpoint/2010/main" val="3335620414"/>
+        <p14:creationId xmlns:p14="http://schemas.microsoft.com/office/powerpoint/2010/main" val="655226769"/>
       </p:ext>
     </p:extLst>
   </p:cSld>
@@ -4170,7 +3354,7 @@
 </p:sld>
 </file>
 
-<file path=ppt/slides/slide20.xml><?xml version="1.0" encoding="utf-8"?>
+<file path=ppt/slides/slide3.xml><?xml version="1.0" encoding="utf-8"?>
 <p:sld xmlns:a="http://schemas.openxmlformats.org/drawingml/2006/main" xmlns:r="http://schemas.openxmlformats.org/officeDocument/2006/relationships" xmlns:p="http://schemas.openxmlformats.org/presentationml/2006/main">
   <p:cSld>
     <p:spTree>
@@ -4187,51 +3371,164 @@
           <a:chExt cx="0" cy="0"/>
         </a:xfrm>
       </p:grpSpPr>
-      <p:pic>
-        <p:nvPicPr>
-          <p:cNvPr id="13314" name="Picture 2" descr="C:\Users\cwellman\AppData\Roaming\PixelMetrics\CaptureWiz\Temp\86.png"/>
-          <p:cNvPicPr>
-            <a:picLocks noChangeAspect="1" noChangeArrowheads="1"/>
-          </p:cNvPicPr>
+      <p:sp>
+        <p:nvSpPr>
+          <p:cNvPr id="2" name="Rectangle 1"/>
+          <p:cNvSpPr/>
           <p:nvPr/>
-        </p:nvPicPr>
-        <p:blipFill>
-          <a:blip r:embed="rId2">
-            <a:extLst>
-              <a:ext uri="{28A0092B-C50C-407E-A947-70E740481C1C}">
-                <a14:useLocalDpi xmlns:a14="http://schemas.microsoft.com/office/drawing/2010/main" val="0"/>
-              </a:ext>
-            </a:extLst>
-          </a:blip>
-          <a:srcRect/>
-          <a:stretch>
-            <a:fillRect/>
-          </a:stretch>
-        </p:blipFill>
-        <p:spPr bwMode="auto">
+        </p:nvSpPr>
+        <p:spPr>
           <a:xfrm>
-            <a:off x="186570" y="163378"/>
-            <a:ext cx="5808273" cy="8701653"/>
+            <a:off x="0" y="0"/>
+            <a:ext cx="6858000" cy="5262979"/>
           </a:xfrm>
           <a:prstGeom prst="rect">
             <a:avLst/>
           </a:prstGeom>
-          <a:noFill/>
-          <a:extLst>
-            <a:ext uri="{909E8E84-426E-40DD-AFC4-6F175D3DCCD1}">
-              <a14:hiddenFill xmlns:a14="http://schemas.microsoft.com/office/drawing/2010/main">
-                <a:solidFill>
-                  <a:srgbClr val="FFFFFF"/>
-                </a:solidFill>
-              </a14:hiddenFill>
-            </a:ext>
-          </a:extLst>
         </p:spPr>
-      </p:pic>
+        <p:txBody>
+          <a:bodyPr wrap="square">
+            <a:spAutoFit/>
+          </a:bodyPr>
+          <a:lstStyle/>
+          <a:p>
+            <a:r>
+              <a:rPr lang="en-US" sz="1600" dirty="0"/>
+              <a:t>WS ch5_3.py</a:t>
+            </a:r>
+          </a:p>
+          <a:p>
+            <a:r>
+              <a:rPr lang="en-US" sz="1600" dirty="0"/>
+              <a:t>Write a function, </a:t>
+            </a:r>
+            <a:r>
+              <a:rPr lang="en-US" sz="1600" dirty="0" err="1"/>
+              <a:t>tell_if_NZP</a:t>
+            </a:r>
+            <a:r>
+              <a:rPr lang="en-US" sz="1600" dirty="0"/>
+              <a:t>(</a:t>
+            </a:r>
+            <a:r>
+              <a:rPr lang="en-US" sz="1600" dirty="0" err="1"/>
+              <a:t>num</a:t>
+            </a:r>
+            <a:r>
+              <a:rPr lang="en-US" sz="1600" dirty="0"/>
+              <a:t>), which prints out an appropriate message</a:t>
+            </a:r>
+          </a:p>
+          <a:p>
+            <a:r>
+              <a:rPr lang="en-US" sz="1600" dirty="0"/>
+              <a:t>telling if </a:t>
+            </a:r>
+            <a:r>
+              <a:rPr lang="en-US" sz="1600" dirty="0" err="1"/>
+              <a:t>num</a:t>
+            </a:r>
+            <a:r>
+              <a:rPr lang="en-US" sz="1600" dirty="0"/>
+              <a:t> is negative, zero or positive.  Assume that </a:t>
+            </a:r>
+            <a:r>
+              <a:rPr lang="en-US" sz="1600" dirty="0" err="1"/>
+              <a:t>num</a:t>
+            </a:r>
+            <a:r>
+              <a:rPr lang="en-US" sz="1600" dirty="0"/>
+              <a:t> is an int.</a:t>
+            </a:r>
+          </a:p>
+          <a:p>
+            <a:r>
+              <a:rPr lang="en-US" sz="1600" dirty="0"/>
+              <a:t>Test the function on </a:t>
+            </a:r>
+            <a:r>
+              <a:rPr lang="en-US" sz="1600" dirty="0" err="1"/>
+              <a:t>ints</a:t>
+            </a:r>
+            <a:r>
+              <a:rPr lang="en-US" sz="1600" dirty="0"/>
+              <a:t> from -2 to 2.</a:t>
+            </a:r>
+          </a:p>
+          <a:p>
+            <a:endParaRPr lang="en-US" sz="1600" dirty="0"/>
+          </a:p>
+          <a:p>
+            <a:endParaRPr lang="en-US" sz="1600" dirty="0"/>
+          </a:p>
+          <a:p>
+            <a:endParaRPr lang="en-US" sz="1600" dirty="0"/>
+          </a:p>
+          <a:p>
+            <a:endParaRPr lang="en-US" sz="1600" dirty="0"/>
+          </a:p>
+          <a:p>
+            <a:endParaRPr lang="en-US" sz="1600" dirty="0"/>
+          </a:p>
+          <a:p>
+            <a:endParaRPr lang="en-US" sz="1600" dirty="0"/>
+          </a:p>
+          <a:p>
+            <a:endParaRPr lang="en-US" sz="1600" dirty="0"/>
+          </a:p>
+          <a:p>
+            <a:r>
+              <a:rPr lang="en-US" sz="1600" dirty="0"/>
+              <a:t>WS ch5_4</a:t>
+            </a:r>
+          </a:p>
+          <a:p>
+            <a:r>
+              <a:rPr lang="en-US" sz="1600" dirty="0"/>
+              <a:t>Find all </a:t>
+            </a:r>
+            <a:r>
+              <a:rPr lang="en-US" sz="1600" dirty="0" err="1"/>
+              <a:t>ints</a:t>
+            </a:r>
+            <a:r>
+              <a:rPr lang="en-US" sz="1600" dirty="0"/>
+              <a:t> from 2 to 250 that are divisible by 7 but not divisible by 3</a:t>
+            </a:r>
+          </a:p>
+          <a:p>
+            <a:r>
+              <a:rPr lang="en-US" sz="1600" dirty="0"/>
+              <a:t>or by 5</a:t>
+            </a:r>
+          </a:p>
+          <a:p>
+            <a:endParaRPr lang="en-US" sz="1600" dirty="0"/>
+          </a:p>
+          <a:p>
+            <a:endParaRPr lang="en-US" sz="1600" dirty="0"/>
+          </a:p>
+          <a:p>
+            <a:endParaRPr lang="en-US" sz="1600" dirty="0"/>
+          </a:p>
+          <a:p>
+            <a:endParaRPr lang="en-US" sz="1600" dirty="0"/>
+          </a:p>
+          <a:p>
+            <a:endParaRPr lang="en-US" sz="1600" dirty="0"/>
+          </a:p>
+          <a:p>
+            <a:endParaRPr lang="en-US" sz="1600" dirty="0"/>
+          </a:p>
+          <a:p>
+            <a:endParaRPr lang="en-US" sz="1600" dirty="0"/>
+          </a:p>
+        </p:txBody>
+      </p:sp>
     </p:spTree>
     <p:extLst>
       <p:ext uri="{BB962C8B-B14F-4D97-AF65-F5344CB8AC3E}">
-        <p14:creationId xmlns:p14="http://schemas.microsoft.com/office/powerpoint/2010/main" val="1125358131"/>
+        <p14:creationId xmlns:p14="http://schemas.microsoft.com/office/powerpoint/2010/main" val="2996737962"/>
       </p:ext>
     </p:extLst>
   </p:cSld>
@@ -4241,7 +3538,7 @@
 </p:sld>
 </file>
 
-<file path=ppt/slides/slide21.xml><?xml version="1.0" encoding="utf-8"?>
+<file path=ppt/slides/slide4.xml><?xml version="1.0" encoding="utf-8"?>
 <p:sld xmlns:a="http://schemas.openxmlformats.org/drawingml/2006/main" xmlns:r="http://schemas.openxmlformats.org/officeDocument/2006/relationships" xmlns:p="http://schemas.openxmlformats.org/presentationml/2006/main">
   <p:cSld>
     <p:spTree>
@@ -4258,51 +3555,110 @@
           <a:chExt cx="0" cy="0"/>
         </a:xfrm>
       </p:grpSpPr>
-      <p:pic>
-        <p:nvPicPr>
-          <p:cNvPr id="14338" name="Picture 2" descr="C:\Users\cwellman\AppData\Roaming\PixelMetrics\CaptureWiz\Temp\87.png"/>
-          <p:cNvPicPr>
-            <a:picLocks noChangeAspect="1" noChangeArrowheads="1"/>
-          </p:cNvPicPr>
+      <p:sp>
+        <p:nvSpPr>
+          <p:cNvPr id="4" name="TextBox 3"/>
+          <p:cNvSpPr txBox="1"/>
           <p:nvPr/>
-        </p:nvPicPr>
-        <p:blipFill>
-          <a:blip r:embed="rId2">
-            <a:extLst>
-              <a:ext uri="{28A0092B-C50C-407E-A947-70E740481C1C}">
-                <a14:useLocalDpi xmlns:a14="http://schemas.microsoft.com/office/drawing/2010/main" val="0"/>
-              </a:ext>
-            </a:extLst>
-          </a:blip>
-          <a:srcRect/>
-          <a:stretch>
-            <a:fillRect/>
-          </a:stretch>
-        </p:blipFill>
-        <p:spPr bwMode="auto">
+        </p:nvSpPr>
+        <p:spPr>
           <a:xfrm>
-            <a:off x="0" y="278970"/>
-            <a:ext cx="5982346" cy="8511295"/>
+            <a:off x="0" y="0"/>
+            <a:ext cx="6416298" cy="2585323"/>
           </a:xfrm>
           <a:prstGeom prst="rect">
             <a:avLst/>
           </a:prstGeom>
           <a:noFill/>
-          <a:extLst>
-            <a:ext uri="{909E8E84-426E-40DD-AFC4-6F175D3DCCD1}">
-              <a14:hiddenFill xmlns:a14="http://schemas.microsoft.com/office/drawing/2010/main">
-                <a:solidFill>
-                  <a:srgbClr val="FFFFFF"/>
-                </a:solidFill>
-              </a14:hiddenFill>
-            </a:ext>
-          </a:extLst>
         </p:spPr>
-      </p:pic>
+        <p:txBody>
+          <a:bodyPr wrap="square" rtlCol="0">
+            <a:spAutoFit/>
+          </a:bodyPr>
+          <a:lstStyle/>
+          <a:p>
+            <a:r>
+              <a:rPr lang="en-US" dirty="0"/>
+              <a:t>WS ch5_5</a:t>
+            </a:r>
+          </a:p>
+          <a:p>
+            <a:r>
+              <a:rPr lang="en-US" dirty="0"/>
+              <a:t>Write a function, tell_if_d3_and_not_d5(</a:t>
+            </a:r>
+            <a:r>
+              <a:rPr lang="en-US" dirty="0" err="1"/>
+              <a:t>num</a:t>
+            </a:r>
+            <a:r>
+              <a:rPr lang="en-US" dirty="0"/>
+              <a:t>),</a:t>
+            </a:r>
+          </a:p>
+          <a:p>
+            <a:r>
+              <a:rPr lang="en-US" dirty="0"/>
+              <a:t>which prints out an appropriate message for all </a:t>
+            </a:r>
+            <a:r>
+              <a:rPr lang="en-US" dirty="0" err="1"/>
+              <a:t>num</a:t>
+            </a:r>
+            <a:endParaRPr lang="en-US" dirty="0"/>
+          </a:p>
+          <a:p>
+            <a:r>
+              <a:rPr lang="en-US" dirty="0"/>
+              <a:t>regarding if </a:t>
+            </a:r>
+            <a:r>
+              <a:rPr lang="en-US" dirty="0" err="1"/>
+              <a:t>num</a:t>
+            </a:r>
+            <a:r>
+              <a:rPr lang="en-US" dirty="0"/>
+              <a:t> is divisible by 3 but</a:t>
+            </a:r>
+          </a:p>
+          <a:p>
+            <a:r>
+              <a:rPr lang="en-US" dirty="0"/>
+              <a:t>not divisible by 5.</a:t>
+            </a:r>
+          </a:p>
+          <a:p>
+            <a:endParaRPr lang="en-US" dirty="0"/>
+          </a:p>
+          <a:p>
+            <a:endParaRPr lang="en-US" dirty="0"/>
+          </a:p>
+          <a:p>
+            <a:r>
+              <a:rPr lang="en-US" dirty="0"/>
+              <a:t>Use this function to print out an appropriate message</a:t>
+            </a:r>
+          </a:p>
+          <a:p>
+            <a:r>
+              <a:rPr lang="en-US" dirty="0"/>
+              <a:t>for each </a:t>
+            </a:r>
+            <a:r>
+              <a:rPr lang="en-US" dirty="0" err="1"/>
+              <a:t>int</a:t>
+            </a:r>
+            <a:r>
+              <a:rPr lang="en-US" dirty="0"/>
+              <a:t> from 2 to 20.</a:t>
+            </a:r>
+          </a:p>
+        </p:txBody>
+      </p:sp>
     </p:spTree>
     <p:extLst>
       <p:ext uri="{BB962C8B-B14F-4D97-AF65-F5344CB8AC3E}">
-        <p14:creationId xmlns:p14="http://schemas.microsoft.com/office/powerpoint/2010/main" val="2814341302"/>
+        <p14:creationId xmlns:p14="http://schemas.microsoft.com/office/powerpoint/2010/main" val="1749491387"/>
       </p:ext>
     </p:extLst>
   </p:cSld>
@@ -4312,7 +3668,497 @@
 </p:sld>
 </file>
 
-<file path=ppt/slides/slide22.xml><?xml version="1.0" encoding="utf-8"?>
+<file path=ppt/slides/slide5.xml><?xml version="1.0" encoding="utf-8"?>
+<p:sld xmlns:a="http://schemas.openxmlformats.org/drawingml/2006/main" xmlns:r="http://schemas.openxmlformats.org/officeDocument/2006/relationships" xmlns:p="http://schemas.openxmlformats.org/presentationml/2006/main">
+  <p:cSld>
+    <p:spTree>
+      <p:nvGrpSpPr>
+        <p:cNvPr id="1" name=""/>
+        <p:cNvGrpSpPr/>
+        <p:nvPr/>
+      </p:nvGrpSpPr>
+      <p:grpSpPr>
+        <a:xfrm>
+          <a:off x="0" y="0"/>
+          <a:ext cx="0" cy="0"/>
+          <a:chOff x="0" y="0"/>
+          <a:chExt cx="0" cy="0"/>
+        </a:xfrm>
+      </p:grpSpPr>
+      <p:sp>
+        <p:nvSpPr>
+          <p:cNvPr id="4" name="TextBox 3"/>
+          <p:cNvSpPr txBox="1"/>
+          <p:nvPr/>
+        </p:nvSpPr>
+        <p:spPr>
+          <a:xfrm>
+            <a:off x="0" y="0"/>
+            <a:ext cx="5470902" cy="1200329"/>
+          </a:xfrm>
+          <a:prstGeom prst="rect">
+            <a:avLst/>
+          </a:prstGeom>
+          <a:noFill/>
+        </p:spPr>
+        <p:txBody>
+          <a:bodyPr wrap="square" rtlCol="0">
+            <a:spAutoFit/>
+          </a:bodyPr>
+          <a:lstStyle/>
+          <a:p>
+            <a:r>
+              <a:rPr lang="en-US" dirty="0"/>
+              <a:t>WS ch5_6</a:t>
+            </a:r>
+          </a:p>
+          <a:p>
+            <a:r>
+              <a:rPr lang="en-US" dirty="0"/>
+              <a:t>Make a truth table for</a:t>
+            </a:r>
+          </a:p>
+          <a:p>
+            <a:r>
+              <a:rPr lang="en-US" dirty="0"/>
+              <a:t>not(x and y)       &amp;       (not x) or (not y)</a:t>
+            </a:r>
+          </a:p>
+          <a:p>
+            <a:r>
+              <a:rPr lang="en-US" dirty="0"/>
+              <a:t>and show that they are equivalent.</a:t>
+            </a:r>
+          </a:p>
+        </p:txBody>
+      </p:sp>
+    </p:spTree>
+    <p:extLst>
+      <p:ext uri="{BB962C8B-B14F-4D97-AF65-F5344CB8AC3E}">
+        <p14:creationId xmlns:p14="http://schemas.microsoft.com/office/powerpoint/2010/main" val="1450854266"/>
+      </p:ext>
+    </p:extLst>
+  </p:cSld>
+  <p:clrMapOvr>
+    <a:masterClrMapping/>
+  </p:clrMapOvr>
+</p:sld>
+</file>
+
+<file path=ppt/slides/slide6.xml><?xml version="1.0" encoding="utf-8"?>
+<p:sld xmlns:a="http://schemas.openxmlformats.org/drawingml/2006/main" xmlns:r="http://schemas.openxmlformats.org/officeDocument/2006/relationships" xmlns:p="http://schemas.openxmlformats.org/presentationml/2006/main">
+  <p:cSld>
+    <p:spTree>
+      <p:nvGrpSpPr>
+        <p:cNvPr id="1" name=""/>
+        <p:cNvGrpSpPr/>
+        <p:nvPr/>
+      </p:nvGrpSpPr>
+      <p:grpSpPr>
+        <a:xfrm>
+          <a:off x="0" y="0"/>
+          <a:ext cx="0" cy="0"/>
+          <a:chOff x="0" y="0"/>
+          <a:chExt cx="0" cy="0"/>
+        </a:xfrm>
+      </p:grpSpPr>
+      <p:sp>
+        <p:nvSpPr>
+          <p:cNvPr id="4" name="TextBox 3"/>
+          <p:cNvSpPr txBox="1"/>
+          <p:nvPr/>
+        </p:nvSpPr>
+        <p:spPr>
+          <a:xfrm>
+            <a:off x="0" y="0"/>
+            <a:ext cx="6338082" cy="4278094"/>
+          </a:xfrm>
+          <a:prstGeom prst="rect">
+            <a:avLst/>
+          </a:prstGeom>
+          <a:noFill/>
+        </p:spPr>
+        <p:txBody>
+          <a:bodyPr wrap="none" rtlCol="0">
+            <a:spAutoFit/>
+          </a:bodyPr>
+          <a:lstStyle/>
+          <a:p>
+            <a:r>
+              <a:rPr lang="en-US" sz="1600" dirty="0"/>
+              <a:t>WS ch5_7</a:t>
+            </a:r>
+          </a:p>
+          <a:p>
+            <a:r>
+              <a:rPr lang="en-US" sz="1600" dirty="0"/>
+              <a:t>Example of a function that returns 2 items:</a:t>
+            </a:r>
+          </a:p>
+          <a:p>
+            <a:endParaRPr lang="en-US" sz="1600" dirty="0"/>
+          </a:p>
+          <a:p>
+            <a:r>
+              <a:rPr lang="en-US" sz="1600" dirty="0" err="1"/>
+              <a:t>def</a:t>
+            </a:r>
+            <a:r>
+              <a:rPr lang="en-US" sz="1600" dirty="0"/>
+              <a:t> </a:t>
+            </a:r>
+            <a:r>
+              <a:rPr lang="en-US" sz="1600" dirty="0" err="1"/>
+              <a:t>sum_diff</a:t>
+            </a:r>
+            <a:r>
+              <a:rPr lang="en-US" sz="1600" dirty="0"/>
+              <a:t>(</a:t>
+            </a:r>
+            <a:r>
+              <a:rPr lang="en-US" sz="1600" dirty="0" err="1"/>
+              <a:t>x,y</a:t>
+            </a:r>
+            <a:r>
+              <a:rPr lang="en-US" sz="1600" dirty="0"/>
+              <a:t>):</a:t>
+            </a:r>
+          </a:p>
+          <a:p>
+            <a:r>
+              <a:rPr lang="en-US" sz="1600" dirty="0"/>
+              <a:t>    '''Returns sum and difference of x and y.'''</a:t>
+            </a:r>
+          </a:p>
+          <a:p>
+            <a:r>
+              <a:rPr lang="en-US" sz="1600" dirty="0"/>
+              <a:t>    Sum = x + y</a:t>
+            </a:r>
+          </a:p>
+          <a:p>
+            <a:r>
+              <a:rPr lang="en-US" sz="1600" dirty="0"/>
+              <a:t>    Diff = x - y</a:t>
+            </a:r>
+          </a:p>
+          <a:p>
+            <a:r>
+              <a:rPr lang="en-US" sz="1600" dirty="0"/>
+              <a:t>    return Sum, Diff</a:t>
+            </a:r>
+          </a:p>
+          <a:p>
+            <a:endParaRPr lang="en-US" sz="1600" dirty="0"/>
+          </a:p>
+          <a:p>
+            <a:r>
+              <a:rPr lang="en-US" sz="1600" dirty="0"/>
+              <a:t>##How to use it:</a:t>
+            </a:r>
+          </a:p>
+          <a:p>
+            <a:endParaRPr lang="en-US" sz="1600" dirty="0"/>
+          </a:p>
+          <a:p>
+            <a:r>
+              <a:rPr lang="en-US" sz="1600" dirty="0"/>
+              <a:t>S,D = </a:t>
+            </a:r>
+            <a:r>
+              <a:rPr lang="en-US" sz="1600" dirty="0" err="1"/>
+              <a:t>sum_diff</a:t>
+            </a:r>
+            <a:r>
+              <a:rPr lang="en-US" sz="1600" dirty="0"/>
+              <a:t>(5,3)</a:t>
+            </a:r>
+          </a:p>
+          <a:p>
+            <a:endParaRPr lang="en-US" sz="1600" dirty="0"/>
+          </a:p>
+          <a:p>
+            <a:r>
+              <a:rPr lang="en-US" sz="1600" dirty="0"/>
+              <a:t>print(S,D)</a:t>
+            </a:r>
+          </a:p>
+          <a:p>
+            <a:endParaRPr lang="en-US" sz="1600" dirty="0"/>
+          </a:p>
+          <a:p>
+            <a:r>
+              <a:rPr lang="en-US" sz="1600" dirty="0"/>
+              <a:t>Write a function, </a:t>
+            </a:r>
+            <a:r>
+              <a:rPr lang="en-US" sz="1600" dirty="0" err="1"/>
+              <a:t>sumSqrs_diffSqrs</a:t>
+            </a:r>
+            <a:r>
+              <a:rPr lang="en-US" sz="1600" dirty="0"/>
+              <a:t>(</a:t>
+            </a:r>
+            <a:r>
+              <a:rPr lang="en-US" sz="1600" dirty="0" err="1"/>
+              <a:t>x,y</a:t>
+            </a:r>
+            <a:r>
+              <a:rPr lang="en-US" sz="1600" dirty="0"/>
+              <a:t>), which returns x^2 + y^2  and</a:t>
+            </a:r>
+          </a:p>
+          <a:p>
+            <a:r>
+              <a:rPr lang="en-US" sz="1600" dirty="0"/>
+              <a:t>x^2 - y^2.  Use </a:t>
+            </a:r>
+            <a:r>
+              <a:rPr lang="en-US" sz="1600" dirty="0" err="1"/>
+              <a:t>sumSqrs_diffSqrs</a:t>
+            </a:r>
+            <a:r>
+              <a:rPr lang="en-US" sz="1600" dirty="0"/>
+              <a:t>(</a:t>
+            </a:r>
+            <a:r>
+              <a:rPr lang="en-US" sz="1600" dirty="0" err="1"/>
+              <a:t>x,y</a:t>
+            </a:r>
+            <a:r>
+              <a:rPr lang="en-US" sz="1600" dirty="0"/>
+              <a:t>) to compute 4^2 + 2^2 and 4^2 - 2^2.</a:t>
+            </a:r>
+          </a:p>
+        </p:txBody>
+      </p:sp>
+    </p:spTree>
+    <p:extLst>
+      <p:ext uri="{BB962C8B-B14F-4D97-AF65-F5344CB8AC3E}">
+        <p14:creationId xmlns:p14="http://schemas.microsoft.com/office/powerpoint/2010/main" val="3516291907"/>
+      </p:ext>
+    </p:extLst>
+  </p:cSld>
+  <p:clrMapOvr>
+    <a:masterClrMapping/>
+  </p:clrMapOvr>
+</p:sld>
+</file>
+
+<file path=ppt/slides/slide7.xml><?xml version="1.0" encoding="utf-8"?>
+<p:sld xmlns:a="http://schemas.openxmlformats.org/drawingml/2006/main" xmlns:r="http://schemas.openxmlformats.org/officeDocument/2006/relationships" xmlns:p="http://schemas.openxmlformats.org/presentationml/2006/main">
+  <p:cSld>
+    <p:spTree>
+      <p:nvGrpSpPr>
+        <p:cNvPr id="1" name=""/>
+        <p:cNvGrpSpPr/>
+        <p:nvPr/>
+      </p:nvGrpSpPr>
+      <p:grpSpPr>
+        <a:xfrm>
+          <a:off x="0" y="0"/>
+          <a:ext cx="0" cy="0"/>
+          <a:chOff x="0" y="0"/>
+          <a:chExt cx="0" cy="0"/>
+        </a:xfrm>
+      </p:grpSpPr>
+      <p:sp>
+        <p:nvSpPr>
+          <p:cNvPr id="4" name="TextBox 3"/>
+          <p:cNvSpPr txBox="1"/>
+          <p:nvPr/>
+        </p:nvSpPr>
+        <p:spPr>
+          <a:xfrm>
+            <a:off x="0" y="0"/>
+            <a:ext cx="6205866" cy="5909310"/>
+          </a:xfrm>
+          <a:prstGeom prst="rect">
+            <a:avLst/>
+          </a:prstGeom>
+          <a:noFill/>
+        </p:spPr>
+        <p:txBody>
+          <a:bodyPr wrap="none" rtlCol="0">
+            <a:spAutoFit/>
+          </a:bodyPr>
+          <a:lstStyle/>
+          <a:p>
+            <a:r>
+              <a:rPr lang="en-US" dirty="0"/>
+              <a:t>WS ch5_8</a:t>
+            </a:r>
+          </a:p>
+          <a:p>
+            <a:r>
+              <a:rPr lang="en-US" dirty="0"/>
+              <a:t>Items can be added to a list using the append method:</a:t>
+            </a:r>
+          </a:p>
+          <a:p>
+            <a:r>
+              <a:rPr lang="en-US" dirty="0"/>
+              <a:t>L = [] ## empty list</a:t>
+            </a:r>
+          </a:p>
+          <a:p>
+            <a:r>
+              <a:rPr lang="en-US" dirty="0"/>
+              <a:t>print(L)</a:t>
+            </a:r>
+          </a:p>
+          <a:p>
+            <a:r>
+              <a:rPr lang="en-US" dirty="0" err="1"/>
+              <a:t>L.append</a:t>
+            </a:r>
+            <a:r>
+              <a:rPr lang="en-US" dirty="0"/>
+              <a:t>(2)</a:t>
+            </a:r>
+          </a:p>
+          <a:p>
+            <a:r>
+              <a:rPr lang="en-US" dirty="0"/>
+              <a:t>print(L)</a:t>
+            </a:r>
+          </a:p>
+          <a:p>
+            <a:r>
+              <a:rPr lang="en-US" dirty="0" err="1"/>
+              <a:t>L.append</a:t>
+            </a:r>
+            <a:r>
+              <a:rPr lang="en-US" dirty="0"/>
+              <a:t>('dog')</a:t>
+            </a:r>
+          </a:p>
+          <a:p>
+            <a:r>
+              <a:rPr lang="en-US" dirty="0"/>
+              <a:t>print(L)</a:t>
+            </a:r>
+          </a:p>
+          <a:p>
+            <a:endParaRPr lang="en-US" dirty="0"/>
+          </a:p>
+          <a:p>
+            <a:r>
+              <a:rPr lang="en-US" dirty="0"/>
+              <a:t>&gt;&gt;&gt; </a:t>
+            </a:r>
+          </a:p>
+          <a:p>
+            <a:r>
+              <a:rPr lang="en-US" dirty="0"/>
+              <a:t>[]</a:t>
+            </a:r>
+          </a:p>
+          <a:p>
+            <a:r>
+              <a:rPr lang="en-US" dirty="0"/>
+              <a:t>[2]</a:t>
+            </a:r>
+          </a:p>
+          <a:p>
+            <a:r>
+              <a:rPr lang="en-US" dirty="0"/>
+              <a:t>[2, 'dog']</a:t>
+            </a:r>
+          </a:p>
+          <a:p>
+            <a:r>
+              <a:rPr lang="en-US" dirty="0"/>
+              <a:t>&gt;&gt;&gt; </a:t>
+            </a:r>
+          </a:p>
+          <a:p>
+            <a:endParaRPr lang="en-US" dirty="0"/>
+          </a:p>
+          <a:p>
+            <a:r>
+              <a:rPr lang="en-US" dirty="0"/>
+              <a:t>Write a function, </a:t>
+            </a:r>
+            <a:r>
+              <a:rPr lang="en-US" dirty="0" err="1"/>
+              <a:t>sep_ints_and_strgs</a:t>
+            </a:r>
+            <a:r>
+              <a:rPr lang="en-US" dirty="0"/>
+              <a:t>(L),  which takes a list, L,</a:t>
+            </a:r>
+          </a:p>
+          <a:p>
+            <a:r>
+              <a:rPr lang="en-US" dirty="0"/>
+              <a:t>of </a:t>
+            </a:r>
+            <a:r>
+              <a:rPr lang="en-US" dirty="0" err="1"/>
+              <a:t>ints</a:t>
+            </a:r>
+            <a:r>
+              <a:rPr lang="en-US" dirty="0"/>
+              <a:t> and strings, as a parameter, and which returns 2 lists, one</a:t>
+            </a:r>
+          </a:p>
+          <a:p>
+            <a:r>
+              <a:rPr lang="en-US" dirty="0"/>
+              <a:t>containing the </a:t>
+            </a:r>
+            <a:r>
+              <a:rPr lang="en-US" dirty="0" err="1"/>
+              <a:t>ints</a:t>
+            </a:r>
+            <a:r>
+              <a:rPr lang="en-US" dirty="0"/>
+              <a:t> from L and the other containing the strings</a:t>
+            </a:r>
+          </a:p>
+          <a:p>
+            <a:r>
+              <a:rPr lang="en-US" dirty="0"/>
+              <a:t>from L.  Use this function to process the list</a:t>
+            </a:r>
+          </a:p>
+          <a:p>
+            <a:r>
+              <a:rPr lang="en-US" dirty="0"/>
+              <a:t>['dog', 3, 7,2,'cat','5']</a:t>
+            </a:r>
+          </a:p>
+          <a:p>
+            <a:r>
+              <a:rPr lang="en-US" dirty="0"/>
+              <a:t>and print out a list of </a:t>
+            </a:r>
+            <a:r>
+              <a:rPr lang="en-US" dirty="0" err="1"/>
+              <a:t>ints</a:t>
+            </a:r>
+            <a:r>
+              <a:rPr lang="en-US" dirty="0"/>
+              <a:t> and a list of strings.</a:t>
+            </a:r>
+          </a:p>
+        </p:txBody>
+      </p:sp>
+    </p:spTree>
+    <p:extLst>
+      <p:ext uri="{BB962C8B-B14F-4D97-AF65-F5344CB8AC3E}">
+        <p14:creationId xmlns:p14="http://schemas.microsoft.com/office/powerpoint/2010/main" val="4007173900"/>
+      </p:ext>
+    </p:extLst>
+  </p:cSld>
+  <p:clrMapOvr>
+    <a:masterClrMapping/>
+  </p:clrMapOvr>
+</p:sld>
+</file>
+
+<file path=ppt/slides/slide8.xml><?xml version="1.0" encoding="utf-8"?>
 <p:sld xmlns:a="http://schemas.openxmlformats.org/drawingml/2006/main" xmlns:r="http://schemas.openxmlformats.org/officeDocument/2006/relationships" xmlns:p="http://schemas.openxmlformats.org/presentationml/2006/main">
   <p:cSld>
     <p:spTree>
@@ -4383,7 +4229,7 @@
 </p:sld>
 </file>
 
-<file path=ppt/slides/slide23.xml><?xml version="1.0" encoding="utf-8"?>
+<file path=ppt/slides/slide9.xml><?xml version="1.0" encoding="utf-8"?>
 <p:sld xmlns:a="http://schemas.openxmlformats.org/drawingml/2006/main" xmlns:r="http://schemas.openxmlformats.org/officeDocument/2006/relationships" xmlns:p="http://schemas.openxmlformats.org/presentationml/2006/main">
   <p:cSld>
     <p:spTree>
@@ -4445,821 +4291,6 @@
     <p:extLst>
       <p:ext uri="{BB962C8B-B14F-4D97-AF65-F5344CB8AC3E}">
         <p14:creationId xmlns:p14="http://schemas.microsoft.com/office/powerpoint/2010/main" val="1163629423"/>
-      </p:ext>
-    </p:extLst>
-  </p:cSld>
-  <p:clrMapOvr>
-    <a:masterClrMapping/>
-  </p:clrMapOvr>
-</p:sld>
-</file>
-
-<file path=ppt/slides/slide24.xml><?xml version="1.0" encoding="utf-8"?>
-<p:sld xmlns:a="http://schemas.openxmlformats.org/drawingml/2006/main" xmlns:r="http://schemas.openxmlformats.org/officeDocument/2006/relationships" xmlns:p="http://schemas.openxmlformats.org/presentationml/2006/main">
-  <p:cSld>
-    <p:spTree>
-      <p:nvGrpSpPr>
-        <p:cNvPr id="1" name=""/>
-        <p:cNvGrpSpPr/>
-        <p:nvPr/>
-      </p:nvGrpSpPr>
-      <p:grpSpPr>
-        <a:xfrm>
-          <a:off x="0" y="0"/>
-          <a:ext cx="0" cy="0"/>
-          <a:chOff x="0" y="0"/>
-          <a:chExt cx="0" cy="0"/>
-        </a:xfrm>
-      </p:grpSpPr>
-      <p:pic>
-        <p:nvPicPr>
-          <p:cNvPr id="17410" name="Picture 2" descr="C:\Users\cwellman\AppData\Roaming\PixelMetrics\CaptureWiz\Temp\90.png"/>
-          <p:cNvPicPr>
-            <a:picLocks noChangeAspect="1" noChangeArrowheads="1"/>
-          </p:cNvPicPr>
-          <p:nvPr/>
-        </p:nvPicPr>
-        <p:blipFill>
-          <a:blip r:embed="rId2">
-            <a:extLst>
-              <a:ext uri="{28A0092B-C50C-407E-A947-70E740481C1C}">
-                <a14:useLocalDpi xmlns:a14="http://schemas.microsoft.com/office/drawing/2010/main" val="0"/>
-              </a:ext>
-            </a:extLst>
-          </a:blip>
-          <a:srcRect/>
-          <a:stretch>
-            <a:fillRect/>
-          </a:stretch>
-        </p:blipFill>
-        <p:spPr bwMode="auto">
-          <a:xfrm>
-            <a:off x="124578" y="-1"/>
-            <a:ext cx="6468401" cy="6261315"/>
-          </a:xfrm>
-          <a:prstGeom prst="rect">
-            <a:avLst/>
-          </a:prstGeom>
-          <a:noFill/>
-          <a:extLst>
-            <a:ext uri="{909E8E84-426E-40DD-AFC4-6F175D3DCCD1}">
-              <a14:hiddenFill xmlns:a14="http://schemas.microsoft.com/office/drawing/2010/main">
-                <a:solidFill>
-                  <a:srgbClr val="FFFFFF"/>
-                </a:solidFill>
-              </a14:hiddenFill>
-            </a:ext>
-          </a:extLst>
-        </p:spPr>
-      </p:pic>
-    </p:spTree>
-    <p:extLst>
-      <p:ext uri="{BB962C8B-B14F-4D97-AF65-F5344CB8AC3E}">
-        <p14:creationId xmlns:p14="http://schemas.microsoft.com/office/powerpoint/2010/main" val="1214920892"/>
-      </p:ext>
-    </p:extLst>
-  </p:cSld>
-  <p:clrMapOvr>
-    <a:masterClrMapping/>
-  </p:clrMapOvr>
-</p:sld>
-</file>
-
-<file path=ppt/slides/slide25.xml><?xml version="1.0" encoding="utf-8"?>
-<p:sld xmlns:a="http://schemas.openxmlformats.org/drawingml/2006/main" xmlns:r="http://schemas.openxmlformats.org/officeDocument/2006/relationships" xmlns:p="http://schemas.openxmlformats.org/presentationml/2006/main">
-  <p:cSld>
-    <p:spTree>
-      <p:nvGrpSpPr>
-        <p:cNvPr id="1" name=""/>
-        <p:cNvGrpSpPr/>
-        <p:nvPr/>
-      </p:nvGrpSpPr>
-      <p:grpSpPr>
-        <a:xfrm>
-          <a:off x="0" y="0"/>
-          <a:ext cx="0" cy="0"/>
-          <a:chOff x="0" y="0"/>
-          <a:chExt cx="0" cy="0"/>
-        </a:xfrm>
-      </p:grpSpPr>
-      <p:sp>
-        <p:nvSpPr>
-          <p:cNvPr id="2" name="TextBox 1"/>
-          <p:cNvSpPr txBox="1"/>
-          <p:nvPr/>
-        </p:nvSpPr>
-        <p:spPr>
-          <a:xfrm>
-            <a:off x="464949" y="542441"/>
-            <a:ext cx="1699504" cy="646331"/>
-          </a:xfrm>
-          <a:prstGeom prst="rect">
-            <a:avLst/>
-          </a:prstGeom>
-          <a:noFill/>
-        </p:spPr>
-        <p:txBody>
-          <a:bodyPr wrap="none" rtlCol="0">
-            <a:spAutoFit/>
-          </a:bodyPr>
-          <a:lstStyle/>
-          <a:p>
-            <a:r>
-              <a:rPr lang="en-US" dirty="0" smtClean="0"/>
-              <a:t>HW: 1,2,6,10,12</a:t>
-            </a:r>
-          </a:p>
-          <a:p>
-            <a:r>
-              <a:rPr lang="en-US" dirty="0" err="1" smtClean="0"/>
-              <a:t>Youtube</a:t>
-            </a:r>
-            <a:r>
-              <a:rPr lang="en-US" dirty="0" smtClean="0"/>
-              <a:t>: 8</a:t>
-            </a:r>
-            <a:endParaRPr lang="en-US" dirty="0"/>
-          </a:p>
-        </p:txBody>
-      </p:sp>
-    </p:spTree>
-    <p:extLst>
-      <p:ext uri="{BB962C8B-B14F-4D97-AF65-F5344CB8AC3E}">
-        <p14:creationId xmlns:p14="http://schemas.microsoft.com/office/powerpoint/2010/main" val="1216958690"/>
-      </p:ext>
-    </p:extLst>
-  </p:cSld>
-  <p:clrMapOvr>
-    <a:masterClrMapping/>
-  </p:clrMapOvr>
-</p:sld>
-</file>
-
-<file path=ppt/slides/slide3.xml><?xml version="1.0" encoding="utf-8"?>
-<p:sld xmlns:a="http://schemas.openxmlformats.org/drawingml/2006/main" xmlns:r="http://schemas.openxmlformats.org/officeDocument/2006/relationships" xmlns:p="http://schemas.openxmlformats.org/presentationml/2006/main">
-  <p:cSld>
-    <p:spTree>
-      <p:nvGrpSpPr>
-        <p:cNvPr id="1" name=""/>
-        <p:cNvGrpSpPr/>
-        <p:nvPr/>
-      </p:nvGrpSpPr>
-      <p:grpSpPr>
-        <a:xfrm>
-          <a:off x="0" y="0"/>
-          <a:ext cx="0" cy="0"/>
-          <a:chOff x="0" y="0"/>
-          <a:chExt cx="0" cy="0"/>
-        </a:xfrm>
-      </p:grpSpPr>
-      <p:sp>
-        <p:nvSpPr>
-          <p:cNvPr id="2" name="TextBox 1"/>
-          <p:cNvSpPr txBox="1"/>
-          <p:nvPr/>
-        </p:nvSpPr>
-        <p:spPr>
-          <a:xfrm>
-            <a:off x="237790" y="697423"/>
-            <a:ext cx="6620210" cy="1754326"/>
-          </a:xfrm>
-          <a:prstGeom prst="rect">
-            <a:avLst/>
-          </a:prstGeom>
-          <a:noFill/>
-        </p:spPr>
-        <p:txBody>
-          <a:bodyPr wrap="none" rtlCol="0">
-            <a:spAutoFit/>
-          </a:bodyPr>
-          <a:lstStyle/>
-          <a:p>
-            <a:r>
-              <a:rPr lang="en-US" dirty="0" smtClean="0"/>
-              <a:t>WS ch5_1</a:t>
-            </a:r>
-          </a:p>
-          <a:p>
-            <a:r>
-              <a:rPr lang="en-US" dirty="0" smtClean="0"/>
-              <a:t>For </a:t>
-            </a:r>
-            <a:r>
-              <a:rPr lang="en-US" dirty="0" err="1" smtClean="0"/>
-              <a:t>ints</a:t>
-            </a:r>
-            <a:r>
-              <a:rPr lang="en-US" dirty="0" smtClean="0"/>
-              <a:t> from 1 to 20, which </a:t>
-            </a:r>
-            <a:r>
-              <a:rPr lang="en-US" dirty="0" err="1" smtClean="0"/>
-              <a:t>ints</a:t>
-            </a:r>
-            <a:r>
-              <a:rPr lang="en-US" dirty="0" smtClean="0"/>
-              <a:t> n is (n % 2 == 0)   and (n % 3 == 0)   ?</a:t>
-            </a:r>
-          </a:p>
-          <a:p>
-            <a:endParaRPr lang="en-US" dirty="0" smtClean="0"/>
-          </a:p>
-          <a:p>
-            <a:r>
-              <a:rPr lang="en-US" dirty="0" smtClean="0"/>
-              <a:t>For </a:t>
-            </a:r>
-            <a:r>
-              <a:rPr lang="en-US" dirty="0" err="1" smtClean="0"/>
-              <a:t>ints</a:t>
-            </a:r>
-            <a:r>
-              <a:rPr lang="en-US" dirty="0" smtClean="0"/>
-              <a:t> from 1 to 20, which </a:t>
-            </a:r>
-            <a:r>
-              <a:rPr lang="en-US" dirty="0" err="1" smtClean="0"/>
-              <a:t>ints</a:t>
-            </a:r>
-            <a:r>
-              <a:rPr lang="en-US" dirty="0" smtClean="0"/>
-              <a:t> n is (n % 2 == 0)   or (n % 3 == 0)   ?</a:t>
-            </a:r>
-          </a:p>
-          <a:p>
-            <a:endParaRPr lang="en-US" dirty="0" smtClean="0"/>
-          </a:p>
-          <a:p>
-            <a:r>
-              <a:rPr lang="en-US" dirty="0" smtClean="0"/>
-              <a:t>What </a:t>
-            </a:r>
-            <a:r>
-              <a:rPr lang="en-US" dirty="0" err="1" smtClean="0"/>
-              <a:t>ints</a:t>
-            </a:r>
-            <a:r>
-              <a:rPr lang="en-US" dirty="0" smtClean="0"/>
-              <a:t> from 1 to 20 satisfy neither condition?</a:t>
-            </a:r>
-            <a:endParaRPr lang="en-US" dirty="0"/>
-          </a:p>
-        </p:txBody>
-      </p:sp>
-    </p:spTree>
-    <p:extLst>
-      <p:ext uri="{BB962C8B-B14F-4D97-AF65-F5344CB8AC3E}">
-        <p14:creationId xmlns:p14="http://schemas.microsoft.com/office/powerpoint/2010/main" val="145390040"/>
-      </p:ext>
-    </p:extLst>
-  </p:cSld>
-  <p:clrMapOvr>
-    <a:masterClrMapping/>
-  </p:clrMapOvr>
-</p:sld>
-</file>
-
-<file path=ppt/slides/slide4.xml><?xml version="1.0" encoding="utf-8"?>
-<p:sld xmlns:a="http://schemas.openxmlformats.org/drawingml/2006/main" xmlns:r="http://schemas.openxmlformats.org/officeDocument/2006/relationships" xmlns:p="http://schemas.openxmlformats.org/presentationml/2006/main">
-  <p:cSld>
-    <p:spTree>
-      <p:nvGrpSpPr>
-        <p:cNvPr id="1" name=""/>
-        <p:cNvGrpSpPr/>
-        <p:nvPr/>
-      </p:nvGrpSpPr>
-      <p:grpSpPr>
-        <a:xfrm>
-          <a:off x="0" y="0"/>
-          <a:ext cx="0" cy="0"/>
-          <a:chOff x="0" y="0"/>
-          <a:chExt cx="0" cy="0"/>
-        </a:xfrm>
-      </p:grpSpPr>
-      <p:pic>
-        <p:nvPicPr>
-          <p:cNvPr id="3074" name="Picture 2" descr="C:\Users\cwellman\AppData\Roaming\PixelMetrics\CaptureWiz\Temp\76.png"/>
-          <p:cNvPicPr>
-            <a:picLocks noChangeAspect="1" noChangeArrowheads="1"/>
-          </p:cNvPicPr>
-          <p:nvPr/>
-        </p:nvPicPr>
-        <p:blipFill>
-          <a:blip r:embed="rId2">
-            <a:extLst>
-              <a:ext uri="{28A0092B-C50C-407E-A947-70E740481C1C}">
-                <a14:useLocalDpi xmlns:a14="http://schemas.microsoft.com/office/drawing/2010/main" val="0"/>
-              </a:ext>
-            </a:extLst>
-          </a:blip>
-          <a:srcRect/>
-          <a:stretch>
-            <a:fillRect/>
-          </a:stretch>
-        </p:blipFill>
-        <p:spPr bwMode="auto">
-          <a:xfrm>
-            <a:off x="186571" y="207747"/>
-            <a:ext cx="5935259" cy="8725054"/>
-          </a:xfrm>
-          <a:prstGeom prst="rect">
-            <a:avLst/>
-          </a:prstGeom>
-          <a:noFill/>
-          <a:extLst>
-            <a:ext uri="{909E8E84-426E-40DD-AFC4-6F175D3DCCD1}">
-              <a14:hiddenFill xmlns:a14="http://schemas.microsoft.com/office/drawing/2010/main">
-                <a:solidFill>
-                  <a:srgbClr val="FFFFFF"/>
-                </a:solidFill>
-              </a14:hiddenFill>
-            </a:ext>
-          </a:extLst>
-        </p:spPr>
-      </p:pic>
-    </p:spTree>
-    <p:extLst>
-      <p:ext uri="{BB962C8B-B14F-4D97-AF65-F5344CB8AC3E}">
-        <p14:creationId xmlns:p14="http://schemas.microsoft.com/office/powerpoint/2010/main" val="191564425"/>
-      </p:ext>
-    </p:extLst>
-  </p:cSld>
-  <p:clrMapOvr>
-    <a:masterClrMapping/>
-  </p:clrMapOvr>
-</p:sld>
-</file>
-
-<file path=ppt/slides/slide5.xml><?xml version="1.0" encoding="utf-8"?>
-<p:sld xmlns:a="http://schemas.openxmlformats.org/drawingml/2006/main" xmlns:r="http://schemas.openxmlformats.org/officeDocument/2006/relationships" xmlns:p="http://schemas.openxmlformats.org/presentationml/2006/main">
-  <p:cSld>
-    <p:spTree>
-      <p:nvGrpSpPr>
-        <p:cNvPr id="1" name=""/>
-        <p:cNvGrpSpPr/>
-        <p:nvPr/>
-      </p:nvGrpSpPr>
-      <p:grpSpPr>
-        <a:xfrm>
-          <a:off x="0" y="0"/>
-          <a:ext cx="0" cy="0"/>
-          <a:chOff x="0" y="0"/>
-          <a:chExt cx="0" cy="0"/>
-        </a:xfrm>
-      </p:grpSpPr>
-      <p:sp>
-        <p:nvSpPr>
-          <p:cNvPr id="4" name="TextBox 3"/>
-          <p:cNvSpPr txBox="1"/>
-          <p:nvPr/>
-        </p:nvSpPr>
-        <p:spPr>
-          <a:xfrm>
-            <a:off x="216977" y="604435"/>
-            <a:ext cx="5780868" cy="1477328"/>
-          </a:xfrm>
-          <a:prstGeom prst="rect">
-            <a:avLst/>
-          </a:prstGeom>
-          <a:noFill/>
-        </p:spPr>
-        <p:txBody>
-          <a:bodyPr wrap="square" rtlCol="0">
-            <a:spAutoFit/>
-          </a:bodyPr>
-          <a:lstStyle/>
-          <a:p>
-            <a:r>
-              <a:rPr lang="en-US" dirty="0"/>
-              <a:t>WS ch5_2.py</a:t>
-            </a:r>
-          </a:p>
-          <a:p>
-            <a:endParaRPr lang="en-US" dirty="0"/>
-          </a:p>
-          <a:p>
-            <a:r>
-              <a:rPr lang="en-US" dirty="0"/>
-              <a:t> WS ch5_2</a:t>
-            </a:r>
-          </a:p>
-          <a:p>
-            <a:r>
-              <a:rPr lang="en-US" dirty="0"/>
-              <a:t>Make a truth table for p and (q or r).  How many rows will the table have?</a:t>
-            </a:r>
-          </a:p>
-        </p:txBody>
-      </p:sp>
-    </p:spTree>
-    <p:extLst>
-      <p:ext uri="{BB962C8B-B14F-4D97-AF65-F5344CB8AC3E}">
-        <p14:creationId xmlns:p14="http://schemas.microsoft.com/office/powerpoint/2010/main" val="655226769"/>
-      </p:ext>
-    </p:extLst>
-  </p:cSld>
-  <p:clrMapOvr>
-    <a:masterClrMapping/>
-  </p:clrMapOvr>
-</p:sld>
-</file>
-
-<file path=ppt/slides/slide6.xml><?xml version="1.0" encoding="utf-8"?>
-<p:sld xmlns:a="http://schemas.openxmlformats.org/drawingml/2006/main" xmlns:r="http://schemas.openxmlformats.org/officeDocument/2006/relationships" xmlns:p="http://schemas.openxmlformats.org/presentationml/2006/main">
-  <p:cSld>
-    <p:spTree>
-      <p:nvGrpSpPr>
-        <p:cNvPr id="1" name=""/>
-        <p:cNvGrpSpPr/>
-        <p:nvPr/>
-      </p:nvGrpSpPr>
-      <p:grpSpPr>
-        <a:xfrm>
-          <a:off x="0" y="0"/>
-          <a:ext cx="0" cy="0"/>
-          <a:chOff x="0" y="0"/>
-          <a:chExt cx="0" cy="0"/>
-        </a:xfrm>
-      </p:grpSpPr>
-      <p:pic>
-        <p:nvPicPr>
-          <p:cNvPr id="4098" name="Picture 2" descr="C:\Users\cwellman\AppData\Roaming\PixelMetrics\CaptureWiz\Temp\77.png"/>
-          <p:cNvPicPr>
-            <a:picLocks noChangeAspect="1" noChangeArrowheads="1"/>
-          </p:cNvPicPr>
-          <p:nvPr/>
-        </p:nvPicPr>
-        <p:blipFill>
-          <a:blip r:embed="rId2">
-            <a:extLst>
-              <a:ext uri="{28A0092B-C50C-407E-A947-70E740481C1C}">
-                <a14:useLocalDpi xmlns:a14="http://schemas.microsoft.com/office/drawing/2010/main" val="0"/>
-              </a:ext>
-            </a:extLst>
-          </a:blip>
-          <a:srcRect/>
-          <a:stretch>
-            <a:fillRect/>
-          </a:stretch>
-        </p:blipFill>
-        <p:spPr bwMode="auto">
-          <a:xfrm>
-            <a:off x="186570" y="186813"/>
-            <a:ext cx="6329037" cy="8786706"/>
-          </a:xfrm>
-          <a:prstGeom prst="rect">
-            <a:avLst/>
-          </a:prstGeom>
-          <a:noFill/>
-          <a:extLst>
-            <a:ext uri="{909E8E84-426E-40DD-AFC4-6F175D3DCCD1}">
-              <a14:hiddenFill xmlns:a14="http://schemas.microsoft.com/office/drawing/2010/main">
-                <a:solidFill>
-                  <a:srgbClr val="FFFFFF"/>
-                </a:solidFill>
-              </a14:hiddenFill>
-            </a:ext>
-          </a:extLst>
-        </p:spPr>
-      </p:pic>
-    </p:spTree>
-    <p:extLst>
-      <p:ext uri="{BB962C8B-B14F-4D97-AF65-F5344CB8AC3E}">
-        <p14:creationId xmlns:p14="http://schemas.microsoft.com/office/powerpoint/2010/main" val="3931340018"/>
-      </p:ext>
-    </p:extLst>
-  </p:cSld>
-  <p:clrMapOvr>
-    <a:masterClrMapping/>
-  </p:clrMapOvr>
-</p:sld>
-</file>
-
-<file path=ppt/slides/slide7.xml><?xml version="1.0" encoding="utf-8"?>
-<p:sld xmlns:a="http://schemas.openxmlformats.org/drawingml/2006/main" xmlns:r="http://schemas.openxmlformats.org/officeDocument/2006/relationships" xmlns:p="http://schemas.openxmlformats.org/presentationml/2006/main">
-  <p:cSld>
-    <p:spTree>
-      <p:nvGrpSpPr>
-        <p:cNvPr id="1" name=""/>
-        <p:cNvGrpSpPr/>
-        <p:nvPr/>
-      </p:nvGrpSpPr>
-      <p:grpSpPr>
-        <a:xfrm>
-          <a:off x="0" y="0"/>
-          <a:ext cx="0" cy="0"/>
-          <a:chOff x="0" y="0"/>
-          <a:chExt cx="0" cy="0"/>
-        </a:xfrm>
-      </p:grpSpPr>
-      <p:pic>
-        <p:nvPicPr>
-          <p:cNvPr id="5122" name="Picture 2" descr="C:\Users\cwellman\AppData\Roaming\PixelMetrics\CaptureWiz\Temp\78.png"/>
-          <p:cNvPicPr>
-            <a:picLocks noChangeAspect="1" noChangeArrowheads="1"/>
-          </p:cNvPicPr>
-          <p:nvPr/>
-        </p:nvPicPr>
-        <p:blipFill>
-          <a:blip r:embed="rId2">
-            <a:extLst>
-              <a:ext uri="{28A0092B-C50C-407E-A947-70E740481C1C}">
-                <a14:useLocalDpi xmlns:a14="http://schemas.microsoft.com/office/drawing/2010/main" val="0"/>
-              </a:ext>
-            </a:extLst>
-          </a:blip>
-          <a:srcRect/>
-          <a:stretch>
-            <a:fillRect/>
-          </a:stretch>
-        </p:blipFill>
-        <p:spPr bwMode="auto">
-          <a:xfrm>
-            <a:off x="155575" y="201935"/>
-            <a:ext cx="6271323" cy="8694092"/>
-          </a:xfrm>
-          <a:prstGeom prst="rect">
-            <a:avLst/>
-          </a:prstGeom>
-          <a:noFill/>
-          <a:extLst>
-            <a:ext uri="{909E8E84-426E-40DD-AFC4-6F175D3DCCD1}">
-              <a14:hiddenFill xmlns:a14="http://schemas.microsoft.com/office/drawing/2010/main">
-                <a:solidFill>
-                  <a:srgbClr val="FFFFFF"/>
-                </a:solidFill>
-              </a14:hiddenFill>
-            </a:ext>
-          </a:extLst>
-        </p:spPr>
-      </p:pic>
-    </p:spTree>
-    <p:extLst>
-      <p:ext uri="{BB962C8B-B14F-4D97-AF65-F5344CB8AC3E}">
-        <p14:creationId xmlns:p14="http://schemas.microsoft.com/office/powerpoint/2010/main" val="4198491305"/>
-      </p:ext>
-    </p:extLst>
-  </p:cSld>
-  <p:clrMapOvr>
-    <a:masterClrMapping/>
-  </p:clrMapOvr>
-</p:sld>
-</file>
-
-<file path=ppt/slides/slide8.xml><?xml version="1.0" encoding="utf-8"?>
-<p:sld xmlns:a="http://schemas.openxmlformats.org/drawingml/2006/main" xmlns:r="http://schemas.openxmlformats.org/officeDocument/2006/relationships" xmlns:p="http://schemas.openxmlformats.org/presentationml/2006/main">
-  <p:cSld>
-    <p:spTree>
-      <p:nvGrpSpPr>
-        <p:cNvPr id="1" name=""/>
-        <p:cNvGrpSpPr/>
-        <p:nvPr/>
-      </p:nvGrpSpPr>
-      <p:grpSpPr>
-        <a:xfrm>
-          <a:off x="0" y="0"/>
-          <a:ext cx="0" cy="0"/>
-          <a:chOff x="0" y="0"/>
-          <a:chExt cx="0" cy="0"/>
-        </a:xfrm>
-      </p:grpSpPr>
-      <p:sp>
-        <p:nvSpPr>
-          <p:cNvPr id="2" name="Rectangle 1"/>
-          <p:cNvSpPr/>
-          <p:nvPr/>
-        </p:nvSpPr>
-        <p:spPr>
-          <a:xfrm>
-            <a:off x="0" y="844135"/>
-            <a:ext cx="6858000" cy="5262979"/>
-          </a:xfrm>
-          <a:prstGeom prst="rect">
-            <a:avLst/>
-          </a:prstGeom>
-        </p:spPr>
-        <p:txBody>
-          <a:bodyPr wrap="square">
-            <a:spAutoFit/>
-          </a:bodyPr>
-          <a:lstStyle/>
-          <a:p>
-            <a:r>
-              <a:rPr lang="en-US" sz="1600" dirty="0" smtClean="0"/>
-              <a:t>WS ch5_3.py</a:t>
-            </a:r>
-          </a:p>
-          <a:p>
-            <a:r>
-              <a:rPr lang="en-US" sz="1600" dirty="0" smtClean="0"/>
-              <a:t>Write a function, </a:t>
-            </a:r>
-            <a:r>
-              <a:rPr lang="en-US" sz="1600" dirty="0" err="1" smtClean="0"/>
-              <a:t>tell_if_NZP</a:t>
-            </a:r>
-            <a:r>
-              <a:rPr lang="en-US" sz="1600" dirty="0" smtClean="0"/>
-              <a:t>(</a:t>
-            </a:r>
-            <a:r>
-              <a:rPr lang="en-US" sz="1600" dirty="0" err="1" smtClean="0"/>
-              <a:t>num</a:t>
-            </a:r>
-            <a:r>
-              <a:rPr lang="en-US" sz="1600" dirty="0" smtClean="0"/>
-              <a:t>), which prints out an appropriate message</a:t>
-            </a:r>
-          </a:p>
-          <a:p>
-            <a:r>
-              <a:rPr lang="en-US" sz="1600" dirty="0" smtClean="0"/>
-              <a:t>telling if </a:t>
-            </a:r>
-            <a:r>
-              <a:rPr lang="en-US" sz="1600" dirty="0" err="1" smtClean="0"/>
-              <a:t>num</a:t>
-            </a:r>
-            <a:r>
-              <a:rPr lang="en-US" sz="1600" dirty="0" smtClean="0"/>
-              <a:t> is negative, zero or positive.  Assume that </a:t>
-            </a:r>
-            <a:r>
-              <a:rPr lang="en-US" sz="1600" dirty="0" err="1" smtClean="0"/>
-              <a:t>num</a:t>
-            </a:r>
-            <a:r>
-              <a:rPr lang="en-US" sz="1600" dirty="0" smtClean="0"/>
-              <a:t> is an int.</a:t>
-            </a:r>
-          </a:p>
-          <a:p>
-            <a:r>
-              <a:rPr lang="en-US" sz="1600" dirty="0" smtClean="0"/>
-              <a:t>Test the function on </a:t>
-            </a:r>
-            <a:r>
-              <a:rPr lang="en-US" sz="1600" dirty="0" err="1" smtClean="0"/>
-              <a:t>ints</a:t>
-            </a:r>
-            <a:r>
-              <a:rPr lang="en-US" sz="1600" dirty="0" smtClean="0"/>
-              <a:t> from -2 to </a:t>
-            </a:r>
-            <a:r>
-              <a:rPr lang="en-US" sz="1600" dirty="0" smtClean="0"/>
-              <a:t>2.</a:t>
-            </a:r>
-          </a:p>
-          <a:p>
-            <a:endParaRPr lang="en-US" sz="1600" dirty="0"/>
-          </a:p>
-          <a:p>
-            <a:endParaRPr lang="en-US" sz="1600" dirty="0" smtClean="0"/>
-          </a:p>
-          <a:p>
-            <a:endParaRPr lang="en-US" sz="1600" dirty="0"/>
-          </a:p>
-          <a:p>
-            <a:endParaRPr lang="en-US" sz="1600" dirty="0" smtClean="0"/>
-          </a:p>
-          <a:p>
-            <a:endParaRPr lang="en-US" sz="1600" dirty="0"/>
-          </a:p>
-          <a:p>
-            <a:endParaRPr lang="en-US" sz="1600" dirty="0" smtClean="0"/>
-          </a:p>
-          <a:p>
-            <a:endParaRPr lang="en-US" sz="1600" dirty="0"/>
-          </a:p>
-          <a:p>
-            <a:r>
-              <a:rPr lang="en-US" sz="1600" dirty="0"/>
-              <a:t>WS ch5_4</a:t>
-            </a:r>
-          </a:p>
-          <a:p>
-            <a:r>
-              <a:rPr lang="en-US" sz="1600" dirty="0"/>
-              <a:t>Find all </a:t>
-            </a:r>
-            <a:r>
-              <a:rPr lang="en-US" sz="1600" dirty="0" err="1"/>
-              <a:t>ints</a:t>
-            </a:r>
-            <a:r>
-              <a:rPr lang="en-US" sz="1600" dirty="0"/>
-              <a:t> from 2 to 250 that are divisible by 7 but not divisible by 3</a:t>
-            </a:r>
-          </a:p>
-          <a:p>
-            <a:r>
-              <a:rPr lang="en-US" sz="1600" dirty="0"/>
-              <a:t>or by </a:t>
-            </a:r>
-            <a:r>
-              <a:rPr lang="en-US" sz="1600" dirty="0" smtClean="0"/>
-              <a:t>5</a:t>
-            </a:r>
-          </a:p>
-          <a:p>
-            <a:endParaRPr lang="en-US" sz="1600" dirty="0"/>
-          </a:p>
-          <a:p>
-            <a:endParaRPr lang="en-US" sz="1600" dirty="0" smtClean="0"/>
-          </a:p>
-          <a:p>
-            <a:endParaRPr lang="en-US" sz="1600" dirty="0"/>
-          </a:p>
-          <a:p>
-            <a:endParaRPr lang="en-US" sz="1600" dirty="0" smtClean="0"/>
-          </a:p>
-          <a:p>
-            <a:endParaRPr lang="en-US" sz="1600" dirty="0"/>
-          </a:p>
-          <a:p>
-            <a:endParaRPr lang="en-US" sz="1600" dirty="0" smtClean="0"/>
-          </a:p>
-          <a:p>
-            <a:endParaRPr lang="en-US" sz="1600" dirty="0"/>
-          </a:p>
-        </p:txBody>
-      </p:sp>
-    </p:spTree>
-    <p:extLst>
-      <p:ext uri="{BB962C8B-B14F-4D97-AF65-F5344CB8AC3E}">
-        <p14:creationId xmlns:p14="http://schemas.microsoft.com/office/powerpoint/2010/main" val="2996737962"/>
-      </p:ext>
-    </p:extLst>
-  </p:cSld>
-  <p:clrMapOvr>
-    <a:masterClrMapping/>
-  </p:clrMapOvr>
-</p:sld>
-</file>
-
-<file path=ppt/slides/slide9.xml><?xml version="1.0" encoding="utf-8"?>
-<p:sld xmlns:a="http://schemas.openxmlformats.org/drawingml/2006/main" xmlns:r="http://schemas.openxmlformats.org/officeDocument/2006/relationships" xmlns:p="http://schemas.openxmlformats.org/presentationml/2006/main">
-  <p:cSld>
-    <p:spTree>
-      <p:nvGrpSpPr>
-        <p:cNvPr id="1" name=""/>
-        <p:cNvGrpSpPr/>
-        <p:nvPr/>
-      </p:nvGrpSpPr>
-      <p:grpSpPr>
-        <a:xfrm>
-          <a:off x="0" y="0"/>
-          <a:ext cx="0" cy="0"/>
-          <a:chOff x="0" y="0"/>
-          <a:chExt cx="0" cy="0"/>
-        </a:xfrm>
-      </p:grpSpPr>
-      <p:pic>
-        <p:nvPicPr>
-          <p:cNvPr id="6146" name="Picture 2" descr="C:\Users\cwellman\AppData\Roaming\PixelMetrics\CaptureWiz\Temp\79.png"/>
-          <p:cNvPicPr>
-            <a:picLocks noChangeAspect="1" noChangeArrowheads="1"/>
-          </p:cNvPicPr>
-          <p:nvPr/>
-        </p:nvPicPr>
-        <p:blipFill>
-          <a:blip r:embed="rId2">
-            <a:extLst>
-              <a:ext uri="{28A0092B-C50C-407E-A947-70E740481C1C}">
-                <a14:useLocalDpi xmlns:a14="http://schemas.microsoft.com/office/drawing/2010/main" val="0"/>
-              </a:ext>
-            </a:extLst>
-          </a:blip>
-          <a:srcRect/>
-          <a:stretch>
-            <a:fillRect/>
-          </a:stretch>
-        </p:blipFill>
-        <p:spPr bwMode="auto">
-          <a:xfrm>
-            <a:off x="171073" y="127861"/>
-            <a:ext cx="6002093" cy="7156342"/>
-          </a:xfrm>
-          <a:prstGeom prst="rect">
-            <a:avLst/>
-          </a:prstGeom>
-          <a:noFill/>
-          <a:extLst>
-            <a:ext uri="{909E8E84-426E-40DD-AFC4-6F175D3DCCD1}">
-              <a14:hiddenFill xmlns:a14="http://schemas.microsoft.com/office/drawing/2010/main">
-                <a:solidFill>
-                  <a:srgbClr val="FFFFFF"/>
-                </a:solidFill>
-              </a14:hiddenFill>
-            </a:ext>
-          </a:extLst>
-        </p:spPr>
-      </p:pic>
-    </p:spTree>
-    <p:extLst>
-      <p:ext uri="{BB962C8B-B14F-4D97-AF65-F5344CB8AC3E}">
-        <p14:creationId xmlns:p14="http://schemas.microsoft.com/office/powerpoint/2010/main" val="120160981"/>
       </p:ext>
     </p:extLst>
   </p:cSld>

</xml_diff>